<commit_message>
Präsi fertig & Diagramm überarbeitet
Der Titel sagt schon alles...
</commit_message>
<xml_diff>
--- a/Dokumentation/Kolloquium Janfi.pptx
+++ b/Dokumentation/Kolloquium Janfi.pptx
@@ -5,29 +5,28 @@
     <p:sldMasterId id="2147483660" r:id="rId4"/>
   </p:sldMasterIdLst>
   <p:notesMasterIdLst>
-    <p:notesMasterId r:id="rId22"/>
+    <p:notesMasterId r:id="rId21"/>
   </p:notesMasterIdLst>
   <p:handoutMasterIdLst>
-    <p:handoutMasterId r:id="rId23"/>
+    <p:handoutMasterId r:id="rId22"/>
   </p:handoutMasterIdLst>
   <p:sldIdLst>
     <p:sldId id="257" r:id="rId5"/>
     <p:sldId id="268" r:id="rId6"/>
     <p:sldId id="267" r:id="rId7"/>
     <p:sldId id="274" r:id="rId8"/>
-    <p:sldId id="269" r:id="rId9"/>
-    <p:sldId id="280" r:id="rId10"/>
-    <p:sldId id="275" r:id="rId11"/>
-    <p:sldId id="270" r:id="rId12"/>
-    <p:sldId id="276" r:id="rId13"/>
-    <p:sldId id="259" r:id="rId14"/>
-    <p:sldId id="272" r:id="rId15"/>
-    <p:sldId id="281" r:id="rId16"/>
-    <p:sldId id="273" r:id="rId17"/>
-    <p:sldId id="277" r:id="rId18"/>
+    <p:sldId id="280" r:id="rId9"/>
+    <p:sldId id="275" r:id="rId10"/>
+    <p:sldId id="270" r:id="rId11"/>
+    <p:sldId id="276" r:id="rId12"/>
+    <p:sldId id="259" r:id="rId13"/>
+    <p:sldId id="272" r:id="rId14"/>
+    <p:sldId id="281" r:id="rId15"/>
+    <p:sldId id="273" r:id="rId16"/>
+    <p:sldId id="277" r:id="rId17"/>
+    <p:sldId id="282" r:id="rId18"/>
     <p:sldId id="271" r:id="rId19"/>
-    <p:sldId id="279" r:id="rId20"/>
-    <p:sldId id="265" r:id="rId21"/>
+    <p:sldId id="265" r:id="rId20"/>
   </p:sldIdLst>
   <p:sldSz cx="12188825" cy="6858000"/>
   <p:notesSz cx="6858000" cy="9144000"/>
@@ -4441,7 +4440,7 @@
         <a:p>
           <a:r>
             <a:rPr lang="de-DE" dirty="0"/>
-            <a:t>Analysephase</a:t>
+            <a:t>Anforderungen</a:t>
           </a:r>
         </a:p>
       </dgm:t>
@@ -4856,7 +4855,7 @@
         <a:p>
           <a:r>
             <a:rPr lang="de-DE" dirty="0"/>
-            <a:t>Analysephase</a:t>
+            <a:t>Anforderungen</a:t>
           </a:r>
         </a:p>
       </dgm:t>
@@ -5268,10 +5267,9 @@
         <a:lstStyle/>
         <a:p>
           <a:r>
-            <a:rPr lang="de-DE"/>
-            <a:t>Analysephase</a:t>
+            <a:rPr lang="de-DE" dirty="0"/>
+            <a:t>Anforderungen</a:t>
           </a:r>
-          <a:endParaRPr lang="de-DE" dirty="0"/>
         </a:p>
       </dgm:t>
     </dgm:pt>
@@ -5689,7 +5687,7 @@
         <a:p>
           <a:r>
             <a:rPr lang="de-DE" dirty="0"/>
-            <a:t>Analysephase</a:t>
+            <a:t>Anforderungen</a:t>
           </a:r>
         </a:p>
       </dgm:t>
@@ -6112,7 +6110,7 @@
         <a:p>
           <a:r>
             <a:rPr lang="de-DE" dirty="0"/>
-            <a:t>Analysephase</a:t>
+            <a:t>Anforderungen</a:t>
           </a:r>
         </a:p>
       </dgm:t>
@@ -6681,7 +6679,7 @@
           </a:pPr>
           <a:r>
             <a:rPr lang="de-DE" sz="3300" kern="1200" dirty="0"/>
-            <a:t>Analysephase</a:t>
+            <a:t>Anforderungen</a:t>
           </a:r>
         </a:p>
       </dsp:txBody>
@@ -7330,7 +7328,7 @@
           </a:pPr>
           <a:r>
             <a:rPr lang="de-DE" sz="3300" kern="1200" dirty="0"/>
-            <a:t>Analysephase</a:t>
+            <a:t>Anforderungen</a:t>
           </a:r>
         </a:p>
       </dsp:txBody>
@@ -7976,10 +7974,9 @@
             <a:buNone/>
           </a:pPr>
           <a:r>
-            <a:rPr lang="de-DE" sz="3300" kern="1200"/>
-            <a:t>Analysephase</a:t>
+            <a:rPr lang="de-DE" sz="3300" kern="1200" dirty="0"/>
+            <a:t>Anforderungen</a:t>
           </a:r>
-          <a:endParaRPr lang="de-DE" sz="3300" kern="1200" dirty="0"/>
         </a:p>
       </dsp:txBody>
       <dsp:txXfrm rot="10800000">
@@ -8622,7 +8619,7 @@
           </a:pPr>
           <a:r>
             <a:rPr lang="de-DE" sz="3300" kern="1200" dirty="0"/>
-            <a:t>Analysephase</a:t>
+            <a:t>Anforderungen</a:t>
           </a:r>
         </a:p>
       </dsp:txBody>
@@ -9261,7 +9258,7 @@
           </a:pPr>
           <a:r>
             <a:rPr lang="de-DE" sz="3300" kern="1200" dirty="0"/>
-            <a:t>Analysephase</a:t>
+            <a:t>Anforderungen</a:t>
           </a:r>
         </a:p>
       </dsp:txBody>
@@ -15769,7 +15766,7 @@
             <a:pPr algn="r" rtl="0"/>
             <a:fld id="{EA8C5A89-D750-4C9C-AD82-BD87E1631370}" type="datetime1">
               <a:rPr lang="de-DE" smtClean="0"/>
-              <a:t>03.07.2018</a:t>
+              <a:t>04.07.2018</a:t>
             </a:fld>
             <a:endParaRPr lang="de-DE" dirty="0"/>
           </a:p>
@@ -15939,7 +15936,7 @@
             <a:fld id="{729E0972-DB1D-4D71-93B8-56ECB99C47FF}" type="datetime1">
               <a:rPr lang="de-DE" smtClean="0"/>
               <a:pPr/>
-              <a:t>03.07.2018</a:t>
+              <a:t>04.07.2018</a:t>
             </a:fld>
             <a:endParaRPr lang="de-DE" dirty="0"/>
           </a:p>
@@ -16363,7 +16360,7 @@
             <a:fld id="{3EBA5BD7-F043-4D1B-AA17-CD412FC534DE}" type="slidenum">
               <a:rPr lang="de-DE" smtClean="0"/>
               <a:pPr/>
-              <a:t>11</a:t>
+              <a:t>10</a:t>
             </a:fld>
             <a:endParaRPr lang="de-DE" dirty="0"/>
           </a:p>
@@ -16465,28 +16462,6 @@
             </a:r>
           </a:p>
           <a:p>
-            <a:pPr lvl="1"/>
-            <a:endParaRPr lang="de-DE" dirty="0"/>
-          </a:p>
-          <a:p>
-            <a:r>
-              <a:rPr lang="de-DE" dirty="0"/>
-              <a:t>Request-Header:</a:t>
-            </a:r>
-          </a:p>
-          <a:p>
-            <a:r>
-              <a:rPr lang="de-DE" dirty="0"/>
-              <a:t>	Gibt Header der Anfrage an</a:t>
-            </a:r>
-          </a:p>
-          <a:p>
-            <a:r>
-              <a:rPr lang="de-DE" dirty="0"/>
-              <a:t>	…</a:t>
-            </a:r>
-          </a:p>
-          <a:p>
             <a:endParaRPr lang="de-DE" dirty="0"/>
           </a:p>
           <a:p>
@@ -16515,7 +16490,7 @@
             <a:fld id="{3EBA5BD7-F043-4D1B-AA17-CD412FC534DE}" type="slidenum">
               <a:rPr lang="de-DE" smtClean="0"/>
               <a:pPr/>
-              <a:t>12</a:t>
+              <a:t>11</a:t>
             </a:fld>
             <a:endParaRPr lang="de-DE" dirty="0"/>
           </a:p>
@@ -16603,7 +16578,7 @@
             <a:fld id="{3EBA5BD7-F043-4D1B-AA17-CD412FC534DE}" type="slidenum">
               <a:rPr lang="de-DE" smtClean="0"/>
               <a:pPr/>
-              <a:t>13</a:t>
+              <a:t>12</a:t>
             </a:fld>
             <a:endParaRPr lang="de-DE" dirty="0"/>
           </a:p>
@@ -16688,7 +16663,7 @@
             <a:fld id="{3EBA5BD7-F043-4D1B-AA17-CD412FC534DE}" type="slidenum">
               <a:rPr lang="de-DE" smtClean="0"/>
               <a:pPr/>
-              <a:t>14</a:t>
+              <a:t>13</a:t>
             </a:fld>
             <a:endParaRPr lang="de-DE" dirty="0"/>
           </a:p>
@@ -16708,6 +16683,94 @@
 </file>
 
 <file path=ppt/notesSlides/notesSlide14.xml><?xml version="1.0" encoding="utf-8"?>
+<p:notes xmlns:a="http://schemas.openxmlformats.org/drawingml/2006/main" xmlns:r="http://schemas.openxmlformats.org/officeDocument/2006/relationships" xmlns:p="http://schemas.openxmlformats.org/presentationml/2006/main">
+  <p:cSld>
+    <p:spTree>
+      <p:nvGrpSpPr>
+        <p:cNvPr id="1" name=""/>
+        <p:cNvGrpSpPr/>
+        <p:nvPr/>
+      </p:nvGrpSpPr>
+      <p:grpSpPr>
+        <a:xfrm>
+          <a:off x="0" y="0"/>
+          <a:ext cx="0" cy="0"/>
+          <a:chOff x="0" y="0"/>
+          <a:chExt cx="0" cy="0"/>
+        </a:xfrm>
+      </p:grpSpPr>
+      <p:sp>
+        <p:nvSpPr>
+          <p:cNvPr id="2" name="Folienbildplatzhalter 1"/>
+          <p:cNvSpPr>
+            <a:spLocks noGrp="1" noRot="1" noChangeAspect="1"/>
+          </p:cNvSpPr>
+          <p:nvPr>
+            <p:ph type="sldImg"/>
+          </p:nvPr>
+        </p:nvSpPr>
+        <p:spPr/>
+      </p:sp>
+      <p:sp>
+        <p:nvSpPr>
+          <p:cNvPr id="3" name="Notizenplatzhalter 2"/>
+          <p:cNvSpPr>
+            <a:spLocks noGrp="1"/>
+          </p:cNvSpPr>
+          <p:nvPr>
+            <p:ph type="body" idx="1"/>
+          </p:nvPr>
+        </p:nvSpPr>
+        <p:spPr/>
+        <p:txBody>
+          <a:bodyPr/>
+          <a:lstStyle/>
+          <a:p>
+            <a:r>
+              <a:rPr lang="de-DE" dirty="0"/>
+              <a:t>„schnell“ ist Definitionssache</a:t>
+            </a:r>
+          </a:p>
+        </p:txBody>
+      </p:sp>
+      <p:sp>
+        <p:nvSpPr>
+          <p:cNvPr id="4" name="Foliennummernplatzhalter 3"/>
+          <p:cNvSpPr>
+            <a:spLocks noGrp="1"/>
+          </p:cNvSpPr>
+          <p:nvPr>
+            <p:ph type="sldNum" sz="quarter" idx="10"/>
+          </p:nvPr>
+        </p:nvSpPr>
+        <p:spPr/>
+        <p:txBody>
+          <a:bodyPr/>
+          <a:lstStyle/>
+          <a:p>
+            <a:fld id="{3EBA5BD7-F043-4D1B-AA17-CD412FC534DE}" type="slidenum">
+              <a:rPr lang="de-DE" smtClean="0"/>
+              <a:pPr/>
+              <a:t>14</a:t>
+            </a:fld>
+            <a:endParaRPr lang="de-DE" dirty="0"/>
+          </a:p>
+        </p:txBody>
+      </p:sp>
+    </p:spTree>
+    <p:extLst>
+      <p:ext uri="{BB962C8B-B14F-4D97-AF65-F5344CB8AC3E}">
+        <p14:creationId xmlns:p14="http://schemas.microsoft.com/office/powerpoint/2010/main" val="1548133618"/>
+      </p:ext>
+    </p:extLst>
+  </p:cSld>
+  <p:clrMapOvr>
+    <a:masterClrMapping/>
+  </p:clrMapOvr>
+</p:notes>
+</file>
+
+<file path=ppt/notesSlides/notesSlide15.xml><?xml version="1.0" encoding="utf-8"?>
 <p:notes xmlns:a="http://schemas.openxmlformats.org/drawingml/2006/main" xmlns:r="http://schemas.openxmlformats.org/officeDocument/2006/relationships" xmlns:p="http://schemas.openxmlformats.org/presentationml/2006/main">
   <p:cSld>
     <p:spTree>
@@ -16808,106 +16871,6 @@
 </p:notes>
 </file>
 
-<file path=ppt/notesSlides/notesSlide15.xml><?xml version="1.0" encoding="utf-8"?>
-<p:notes xmlns:a="http://schemas.openxmlformats.org/drawingml/2006/main" xmlns:r="http://schemas.openxmlformats.org/officeDocument/2006/relationships" xmlns:p="http://schemas.openxmlformats.org/presentationml/2006/main">
-  <p:cSld>
-    <p:spTree>
-      <p:nvGrpSpPr>
-        <p:cNvPr id="1" name=""/>
-        <p:cNvGrpSpPr/>
-        <p:nvPr/>
-      </p:nvGrpSpPr>
-      <p:grpSpPr>
-        <a:xfrm>
-          <a:off x="0" y="0"/>
-          <a:ext cx="0" cy="0"/>
-          <a:chOff x="0" y="0"/>
-          <a:chExt cx="0" cy="0"/>
-        </a:xfrm>
-      </p:grpSpPr>
-      <p:sp>
-        <p:nvSpPr>
-          <p:cNvPr id="2" name="Folienbildplatzhalter 1"/>
-          <p:cNvSpPr>
-            <a:spLocks noGrp="1" noRot="1" noChangeAspect="1"/>
-          </p:cNvSpPr>
-          <p:nvPr>
-            <p:ph type="sldImg"/>
-          </p:nvPr>
-        </p:nvSpPr>
-        <p:spPr/>
-      </p:sp>
-      <p:sp>
-        <p:nvSpPr>
-          <p:cNvPr id="3" name="Notizenplatzhalter 2"/>
-          <p:cNvSpPr>
-            <a:spLocks noGrp="1"/>
-          </p:cNvSpPr>
-          <p:nvPr>
-            <p:ph type="body" idx="1"/>
-          </p:nvPr>
-        </p:nvSpPr>
-        <p:spPr/>
-        <p:txBody>
-          <a:bodyPr/>
-          <a:lstStyle/>
-          <a:p>
-            <a:r>
-              <a:rPr lang="de-DE" dirty="0"/>
-              <a:t>Erste zwei Anforderungen erfüllt</a:t>
-            </a:r>
-          </a:p>
-          <a:p>
-            <a:r>
-              <a:rPr lang="de-DE" dirty="0"/>
-              <a:t>Dritte teils erfüllt: 	Da Controller nur alle x Minuten (aktuell 10) erwacht, wird im schlimmsten Fall erst nach 10 Minuten geändert</a:t>
-            </a:r>
-          </a:p>
-          <a:p>
-            <a:r>
-              <a:rPr lang="de-DE" dirty="0"/>
-              <a:t>Keine Umsetzung der Programmiersprache</a:t>
-            </a:r>
-          </a:p>
-        </p:txBody>
-      </p:sp>
-      <p:sp>
-        <p:nvSpPr>
-          <p:cNvPr id="4" name="Foliennummernplatzhalter 3"/>
-          <p:cNvSpPr>
-            <a:spLocks noGrp="1"/>
-          </p:cNvSpPr>
-          <p:nvPr>
-            <p:ph type="sldNum" sz="quarter" idx="10"/>
-          </p:nvPr>
-        </p:nvSpPr>
-        <p:spPr/>
-        <p:txBody>
-          <a:bodyPr/>
-          <a:lstStyle/>
-          <a:p>
-            <a:fld id="{3EBA5BD7-F043-4D1B-AA17-CD412FC534DE}" type="slidenum">
-              <a:rPr lang="de-DE" smtClean="0"/>
-              <a:pPr/>
-              <a:t>16</a:t>
-            </a:fld>
-            <a:endParaRPr lang="de-DE" dirty="0"/>
-          </a:p>
-        </p:txBody>
-      </p:sp>
-    </p:spTree>
-    <p:extLst>
-      <p:ext uri="{BB962C8B-B14F-4D97-AF65-F5344CB8AC3E}">
-        <p14:creationId xmlns:p14="http://schemas.microsoft.com/office/powerpoint/2010/main" val="3603048229"/>
-      </p:ext>
-    </p:extLst>
-  </p:cSld>
-  <p:clrMapOvr>
-    <a:masterClrMapping/>
-  </p:clrMapOvr>
-</p:notes>
-</file>
-
 <file path=ppt/notesSlides/notesSlide16.xml><?xml version="1.0" encoding="utf-8"?>
 <p:notes xmlns:a="http://schemas.openxmlformats.org/drawingml/2006/main" xmlns:r="http://schemas.openxmlformats.org/officeDocument/2006/relationships" xmlns:p="http://schemas.openxmlformats.org/presentationml/2006/main">
   <p:cSld>
@@ -16974,7 +16937,7 @@
             <a:pPr rtl="0"/>
             <a:fld id="{3EBA5BD7-F043-4D1B-AA17-CD412FC534DE}" type="slidenum">
               <a:rPr lang="de-DE" smtClean="0"/>
-              <a:t>17</a:t>
+              <a:t>16</a:t>
             </a:fld>
             <a:endParaRPr lang="de-DE" dirty="0"/>
           </a:p>
@@ -17318,6 +17281,30 @@
           <a:p>
             <a:r>
               <a:rPr lang="de-DE" dirty="0"/>
+              <a:t>Modulare Programme</a:t>
+            </a:r>
+          </a:p>
+          <a:p>
+            <a:r>
+              <a:rPr lang="de-DE" dirty="0"/>
+              <a:t>Ausführliche Kommentierung</a:t>
+            </a:r>
+          </a:p>
+          <a:p>
+            <a:r>
+              <a:rPr lang="de-DE" dirty="0">
+                <a:sym typeface="Wingdings" panose="05000000000000000000" pitchFamily="2" charset="2"/>
+              </a:rPr>
+              <a:t> Beide wichtig für Weiterverarbeitung</a:t>
+            </a:r>
+            <a:endParaRPr lang="de-DE" dirty="0"/>
+          </a:p>
+          <a:p>
+            <a:endParaRPr lang="de-DE" dirty="0"/>
+          </a:p>
+          <a:p>
+            <a:r>
+              <a:rPr lang="de-DE" dirty="0"/>
               <a:t>Eigene Anforderungen:</a:t>
             </a:r>
           </a:p>
@@ -17336,37 +17323,10 @@
           <a:p>
             <a:r>
               <a:rPr lang="de-DE" dirty="0"/>
-              <a:t>Anzeigen von Bildern und Texten</a:t>
+              <a:t>Anzeigen von Bildern und Texte</a:t>
             </a:r>
           </a:p>
           <a:p>
-            <a:endParaRPr lang="de-DE" dirty="0"/>
-          </a:p>
-          <a:p>
-            <a:r>
-              <a:rPr lang="de-DE" dirty="0"/>
-              <a:t>Modulare Programme</a:t>
-            </a:r>
-          </a:p>
-          <a:p>
-            <a:r>
-              <a:rPr lang="de-DE" dirty="0"/>
-              <a:t>Ausführliche Kommentierung</a:t>
-            </a:r>
-          </a:p>
-          <a:p>
-            <a:r>
-              <a:rPr lang="de-DE" dirty="0">
-                <a:sym typeface="Wingdings" panose="05000000000000000000" pitchFamily="2" charset="2"/>
-              </a:rPr>
-              <a:t> Beide wichtig für </a:t>
-            </a:r>
-            <a:r>
-              <a:rPr lang="de-DE" dirty="0" err="1">
-                <a:sym typeface="Wingdings" panose="05000000000000000000" pitchFamily="2" charset="2"/>
-              </a:rPr>
-              <a:t>weiterverarbeitung</a:t>
-            </a:r>
             <a:endParaRPr lang="de-DE" dirty="0"/>
           </a:p>
         </p:txBody>
@@ -17389,7 +17349,7 @@
             <a:fld id="{3EBA5BD7-F043-4D1B-AA17-CD412FC534DE}" type="slidenum">
               <a:rPr lang="de-DE" smtClean="0"/>
               <a:pPr/>
-              <a:t>6</a:t>
+              <a:t>5</a:t>
             </a:fld>
             <a:endParaRPr lang="de-DE" dirty="0"/>
           </a:p>
@@ -17474,7 +17434,7 @@
             <a:fld id="{3EBA5BD7-F043-4D1B-AA17-CD412FC534DE}" type="slidenum">
               <a:rPr lang="de-DE" smtClean="0"/>
               <a:pPr/>
-              <a:t>7</a:t>
+              <a:t>6</a:t>
             </a:fld>
             <a:endParaRPr lang="de-DE" dirty="0"/>
           </a:p>
@@ -17626,7 +17586,7 @@
             <a:pPr rtl="0"/>
             <a:fld id="{3EBA5BD7-F043-4D1B-AA17-CD412FC534DE}" type="slidenum">
               <a:rPr lang="en-US" smtClean="0"/>
-              <a:t>8</a:t>
+              <a:t>7</a:t>
             </a:fld>
             <a:endParaRPr lang="en-US"/>
           </a:p>
@@ -17711,7 +17671,7 @@
             <a:fld id="{3EBA5BD7-F043-4D1B-AA17-CD412FC534DE}" type="slidenum">
               <a:rPr lang="de-DE" smtClean="0"/>
               <a:pPr/>
-              <a:t>9</a:t>
+              <a:t>8</a:t>
             </a:fld>
             <a:endParaRPr lang="de-DE" dirty="0"/>
           </a:p>
@@ -17840,7 +17800,7 @@
             <a:fld id="{3EBA5BD7-F043-4D1B-AA17-CD412FC534DE}" type="slidenum">
               <a:rPr lang="de-DE" smtClean="0"/>
               <a:pPr/>
-              <a:t>10</a:t>
+              <a:t>9</a:t>
             </a:fld>
             <a:endParaRPr lang="de-DE" dirty="0"/>
           </a:p>
@@ -18621,7 +18581,7 @@
           <a:p>
             <a:fld id="{5A09CFD7-FC86-4C82-9E1B-F351AC8184BB}" type="datetime1">
               <a:rPr lang="de-DE" smtClean="0"/>
-              <a:t>03.07.2018</a:t>
+              <a:t>04.07.2018</a:t>
             </a:fld>
             <a:endParaRPr lang="de-DE" dirty="0"/>
           </a:p>
@@ -18830,7 +18790,7 @@
           <a:p>
             <a:fld id="{038A29F2-5EB4-4EA6-972B-B8E49DA927FE}" type="datetime1">
               <a:rPr lang="de-DE" smtClean="0"/>
-              <a:t>03.07.2018</a:t>
+              <a:t>04.07.2018</a:t>
             </a:fld>
             <a:endParaRPr lang="de-DE" dirty="0"/>
           </a:p>
@@ -19049,7 +19009,7 @@
           <a:p>
             <a:fld id="{8D0D0724-94A9-4F1A-89E8-E06329536902}" type="datetime1">
               <a:rPr lang="de-DE" smtClean="0"/>
-              <a:t>03.07.2018</a:t>
+              <a:t>04.07.2018</a:t>
             </a:fld>
             <a:endParaRPr lang="de-DE" dirty="0"/>
           </a:p>
@@ -19258,7 +19218,7 @@
           <a:p>
             <a:fld id="{BDC426D2-37BC-4D6E-8BCD-0EB884315D40}" type="datetime1">
               <a:rPr lang="de-DE" smtClean="0"/>
-              <a:t>03.07.2018</a:t>
+              <a:t>04.07.2018</a:t>
             </a:fld>
             <a:endParaRPr lang="de-DE" dirty="0"/>
           </a:p>
@@ -19701,7 +19661,7 @@
           <a:p>
             <a:fld id="{E3AFF1A1-558B-43BD-95CD-96015316B91C}" type="datetime1">
               <a:rPr lang="de-DE" smtClean="0"/>
-              <a:t>03.07.2018</a:t>
+              <a:t>04.07.2018</a:t>
             </a:fld>
             <a:endParaRPr lang="de-DE" dirty="0"/>
           </a:p>
@@ -20016,7 +19976,7 @@
           <a:p>
             <a:fld id="{8E1F56F0-FBD8-46B8-9CCE-1375C46ECCCC}" type="datetime1">
               <a:rPr lang="de-DE" smtClean="0"/>
-              <a:t>03.07.2018</a:t>
+              <a:t>04.07.2018</a:t>
             </a:fld>
             <a:endParaRPr lang="de-DE" dirty="0"/>
           </a:p>
@@ -20483,7 +20443,7 @@
           <a:p>
             <a:fld id="{ED849104-7AD3-412B-818F-6CE6DB6DF07F}" type="datetime1">
               <a:rPr lang="de-DE" smtClean="0"/>
-              <a:t>03.07.2018</a:t>
+              <a:t>04.07.2018</a:t>
             </a:fld>
             <a:endParaRPr lang="de-DE" dirty="0"/>
           </a:p>
@@ -20624,7 +20584,7 @@
           <a:p>
             <a:fld id="{CA86FA3F-CDFC-4A22-8B37-9097DF15AE9F}" type="datetime1">
               <a:rPr lang="de-DE" smtClean="0"/>
-              <a:t>03.07.2018</a:t>
+              <a:t>04.07.2018</a:t>
             </a:fld>
             <a:endParaRPr lang="de-DE" dirty="0"/>
           </a:p>
@@ -20741,7 +20701,7 @@
           <a:p>
             <a:fld id="{B82F912C-72CF-43A5-8EEB-3B1F5B9575CC}" type="datetime1">
               <a:rPr lang="de-DE" smtClean="0"/>
-              <a:t>03.07.2018</a:t>
+              <a:t>04.07.2018</a:t>
             </a:fld>
             <a:endParaRPr lang="de-DE" dirty="0"/>
           </a:p>
@@ -21051,7 +21011,7 @@
           <a:p>
             <a:fld id="{A27F02E9-F370-42C3-BEB2-97E80693102B}" type="datetime1">
               <a:rPr lang="de-DE" smtClean="0"/>
-              <a:t>03.07.2018</a:t>
+              <a:t>04.07.2018</a:t>
             </a:fld>
             <a:endParaRPr lang="de-DE" dirty="0"/>
           </a:p>
@@ -21351,7 +21311,7 @@
           <a:p>
             <a:fld id="{BBFB9B96-9FF9-4FDE-8196-917542E5F6F3}" type="datetime1">
               <a:rPr lang="de-DE" smtClean="0"/>
-              <a:t>03.07.2018</a:t>
+              <a:t>04.07.2018</a:t>
             </a:fld>
             <a:endParaRPr lang="de-DE" dirty="0"/>
           </a:p>
@@ -21978,7 +21938,7 @@
           <a:p>
             <a:fld id="{BAC6B33D-9E43-46BC-9DFA-9B42F761A70D}" type="datetime1">
               <a:rPr lang="de-DE" smtClean="0"/>
-              <a:t>03.07.2018</a:t>
+              <a:t>04.07.2018</a:t>
             </a:fld>
             <a:endParaRPr lang="de-DE" dirty="0"/>
           </a:p>
@@ -22580,171 +22540,6 @@
             <a:pPr algn="ctr" rtl="0"/>
             <a:r>
               <a:rPr lang="de-DE" dirty="0"/>
-              <a:t>Umsetzung - Kommunikation</a:t>
-            </a:r>
-          </a:p>
-        </p:txBody>
-      </p:sp>
-      <p:pic>
-        <p:nvPicPr>
-          <p:cNvPr id="8" name="Inhaltsplatzhalter 7">
-            <a:extLst>
-              <a:ext uri="{FF2B5EF4-FFF2-40B4-BE49-F238E27FC236}">
-                <a16:creationId xmlns:a16="http://schemas.microsoft.com/office/drawing/2014/main" id="{43E8FCE4-A37C-4C02-9439-EFC1BC76FBE3}"/>
-              </a:ext>
-            </a:extLst>
-          </p:cNvPr>
-          <p:cNvPicPr>
-            <a:picLocks noGrp="1" noChangeAspect="1"/>
-          </p:cNvPicPr>
-          <p:nvPr>
-            <p:ph idx="1"/>
-          </p:nvPr>
-        </p:nvPicPr>
-        <p:blipFill>
-          <a:blip r:embed="rId3">
-            <a:extLst>
-              <a:ext uri="{28A0092B-C50C-407E-A947-70E740481C1C}">
-                <a14:useLocalDpi xmlns:a14="http://schemas.microsoft.com/office/drawing/2010/main" val="0"/>
-              </a:ext>
-            </a:extLst>
-          </a:blip>
-          <a:stretch>
-            <a:fillRect/>
-          </a:stretch>
-        </p:blipFill>
-        <p:spPr>
-          <a:xfrm>
-            <a:off x="2262474" y="1034905"/>
-            <a:ext cx="8283552" cy="5227948"/>
-          </a:xfrm>
-        </p:spPr>
-      </p:pic>
-      <p:sp>
-        <p:nvSpPr>
-          <p:cNvPr id="2" name="Fußzeilenplatzhalter 1">
-            <a:extLst>
-              <a:ext uri="{FF2B5EF4-FFF2-40B4-BE49-F238E27FC236}">
-                <a16:creationId xmlns:a16="http://schemas.microsoft.com/office/drawing/2014/main" id="{366F0BE8-B140-4101-8D7F-49063527154F}"/>
-              </a:ext>
-            </a:extLst>
-          </p:cNvPr>
-          <p:cNvSpPr>
-            <a:spLocks noGrp="1"/>
-          </p:cNvSpPr>
-          <p:nvPr>
-            <p:ph type="ftr" sz="quarter" idx="11"/>
-          </p:nvPr>
-        </p:nvSpPr>
-        <p:spPr/>
-        <p:txBody>
-          <a:bodyPr/>
-          <a:lstStyle/>
-          <a:p>
-            <a:pPr rtl="0"/>
-            <a:r>
-              <a:rPr lang="de-DE"/>
-              <a:t>Jan-Philipp Töberg / Projektarbeit SS18</a:t>
-            </a:r>
-            <a:endParaRPr lang="de-DE" dirty="0"/>
-          </a:p>
-        </p:txBody>
-      </p:sp>
-      <p:sp>
-        <p:nvSpPr>
-          <p:cNvPr id="3" name="Foliennummernplatzhalter 2">
-            <a:extLst>
-              <a:ext uri="{FF2B5EF4-FFF2-40B4-BE49-F238E27FC236}">
-                <a16:creationId xmlns:a16="http://schemas.microsoft.com/office/drawing/2014/main" id="{E1496EE6-9889-4F3B-B37C-7370A6BFE472}"/>
-              </a:ext>
-            </a:extLst>
-          </p:cNvPr>
-          <p:cNvSpPr>
-            <a:spLocks noGrp="1"/>
-          </p:cNvSpPr>
-          <p:nvPr>
-            <p:ph type="sldNum" sz="quarter" idx="12"/>
-          </p:nvPr>
-        </p:nvSpPr>
-        <p:spPr/>
-        <p:txBody>
-          <a:bodyPr/>
-          <a:lstStyle/>
-          <a:p>
-            <a:pPr rtl="0"/>
-            <a:fld id="{C014DD1E-5D91-48A3-AD6D-45FBA980D106}" type="slidenum">
-              <a:rPr lang="de-DE" smtClean="0"/>
-              <a:t>10</a:t>
-            </a:fld>
-            <a:endParaRPr lang="de-DE" dirty="0"/>
-          </a:p>
-        </p:txBody>
-      </p:sp>
-    </p:spTree>
-    <p:extLst>
-      <p:ext uri="{BB962C8B-B14F-4D97-AF65-F5344CB8AC3E}">
-        <p14:creationId xmlns:p14="http://schemas.microsoft.com/office/powerpoint/2010/main" val="4264977537"/>
-      </p:ext>
-    </p:extLst>
-  </p:cSld>
-  <p:clrMapOvr>
-    <a:masterClrMapping/>
-  </p:clrMapOvr>
-  <mc:AlternateContent xmlns:mc="http://schemas.openxmlformats.org/markup-compatibility/2006" xmlns:p14="http://schemas.microsoft.com/office/powerpoint/2010/main">
-    <mc:Choice Requires="p14">
-      <p:transition spd="med" p14:dur="700">
-        <p:fade/>
-      </p:transition>
-    </mc:Choice>
-    <mc:Fallback xmlns="">
-      <p:transition spd="med">
-        <p:fade/>
-      </p:transition>
-    </mc:Fallback>
-  </mc:AlternateContent>
-</p:sld>
-</file>
-
-<file path=ppt/slides/slide11.xml><?xml version="1.0" encoding="utf-8"?>
-<p:sld xmlns:a="http://schemas.openxmlformats.org/drawingml/2006/main" xmlns:r="http://schemas.openxmlformats.org/officeDocument/2006/relationships" xmlns:p="http://schemas.openxmlformats.org/presentationml/2006/main">
-  <p:cSld>
-    <p:spTree>
-      <p:nvGrpSpPr>
-        <p:cNvPr id="1" name=""/>
-        <p:cNvGrpSpPr/>
-        <p:nvPr/>
-      </p:nvGrpSpPr>
-      <p:grpSpPr>
-        <a:xfrm>
-          <a:off x="0" y="0"/>
-          <a:ext cx="0" cy="0"/>
-          <a:chOff x="0" y="0"/>
-          <a:chExt cx="0" cy="0"/>
-        </a:xfrm>
-      </p:grpSpPr>
-      <p:sp>
-        <p:nvSpPr>
-          <p:cNvPr id="4" name="Titel 3"/>
-          <p:cNvSpPr>
-            <a:spLocks noGrp="1"/>
-          </p:cNvSpPr>
-          <p:nvPr>
-            <p:ph type="title"/>
-          </p:nvPr>
-        </p:nvSpPr>
-        <p:spPr>
-          <a:xfrm>
-            <a:off x="1224000" y="270000"/>
-            <a:ext cx="10360501" cy="634083"/>
-          </a:xfrm>
-        </p:spPr>
-        <p:txBody>
-          <a:bodyPr rtlCol="0"/>
-          <a:lstStyle/>
-          <a:p>
-            <a:pPr algn="ctr" rtl="0"/>
-            <a:r>
-              <a:rPr lang="de-DE" dirty="0"/>
               <a:t>Umsetzung - Client</a:t>
             </a:r>
           </a:p>
@@ -22839,7 +22634,7 @@
             <a:pPr rtl="0"/>
             <a:fld id="{C014DD1E-5D91-48A3-AD6D-45FBA980D106}" type="slidenum">
               <a:rPr lang="de-DE" smtClean="0"/>
-              <a:t>11</a:t>
+              <a:t>10</a:t>
             </a:fld>
             <a:endParaRPr lang="de-DE" dirty="0"/>
           </a:p>
@@ -22911,112 +22706,8 @@
         </p:nvSpPr>
         <p:spPr>
           <a:xfrm>
-            <a:off x="1213839" y="1846784"/>
-            <a:ext cx="2720334" cy="921732"/>
-          </a:xfrm>
-          <a:prstGeom prst="rect">
-            <a:avLst/>
-          </a:prstGeom>
-          <a:noFill/>
-          <a:ln>
-            <a:solidFill>
-              <a:srgbClr val="FF0000"/>
-            </a:solidFill>
-          </a:ln>
-        </p:spPr>
-        <p:style>
-          <a:lnRef idx="2">
-            <a:schemeClr val="accent1">
-              <a:shade val="50000"/>
-            </a:schemeClr>
-          </a:lnRef>
-          <a:fillRef idx="1">
-            <a:schemeClr val="accent1"/>
-          </a:fillRef>
-          <a:effectRef idx="0">
-            <a:schemeClr val="accent1"/>
-          </a:effectRef>
-          <a:fontRef idx="minor">
-            <a:schemeClr val="lt1"/>
-          </a:fontRef>
-        </p:style>
-        <p:txBody>
-          <a:bodyPr rtlCol="0" anchor="ctr"/>
-          <a:lstStyle/>
-          <a:p>
-            <a:pPr algn="ctr"/>
-            <a:endParaRPr lang="de-DE" sz="2800"/>
-          </a:p>
-        </p:txBody>
-      </p:sp>
-      <p:sp>
-        <p:nvSpPr>
-          <p:cNvPr id="10" name="Rechteck 9">
-            <a:extLst>
-              <a:ext uri="{FF2B5EF4-FFF2-40B4-BE49-F238E27FC236}">
-                <a16:creationId xmlns:a16="http://schemas.microsoft.com/office/drawing/2014/main" id="{C53AB220-1BB3-406E-8803-B06DBE8C66B5}"/>
-              </a:ext>
-            </a:extLst>
-          </p:cNvPr>
-          <p:cNvSpPr/>
-          <p:nvPr/>
-        </p:nvSpPr>
-        <p:spPr>
-          <a:xfrm>
-            <a:off x="1224000" y="2968133"/>
-            <a:ext cx="10355384" cy="1121351"/>
-          </a:xfrm>
-          <a:prstGeom prst="rect">
-            <a:avLst/>
-          </a:prstGeom>
-          <a:noFill/>
-          <a:ln>
-            <a:solidFill>
-              <a:srgbClr val="FF0000"/>
-            </a:solidFill>
-          </a:ln>
-        </p:spPr>
-        <p:style>
-          <a:lnRef idx="2">
-            <a:schemeClr val="accent1">
-              <a:shade val="50000"/>
-            </a:schemeClr>
-          </a:lnRef>
-          <a:fillRef idx="1">
-            <a:schemeClr val="accent1"/>
-          </a:fillRef>
-          <a:effectRef idx="0">
-            <a:schemeClr val="accent1"/>
-          </a:effectRef>
-          <a:fontRef idx="minor">
-            <a:schemeClr val="lt1"/>
-          </a:fontRef>
-        </p:style>
-        <p:txBody>
-          <a:bodyPr rtlCol="0" anchor="ctr"/>
-          <a:lstStyle/>
-          <a:p>
-            <a:pPr algn="ctr"/>
-            <a:endParaRPr lang="de-DE" sz="2800"/>
-          </a:p>
-        </p:txBody>
-      </p:sp>
-      <p:sp>
-        <p:nvSpPr>
-          <p:cNvPr id="11" name="Rechteck 10">
-            <a:extLst>
-              <a:ext uri="{FF2B5EF4-FFF2-40B4-BE49-F238E27FC236}">
-                <a16:creationId xmlns:a16="http://schemas.microsoft.com/office/drawing/2014/main" id="{A4F5292E-285A-488E-82AF-5E481A2CB773}"/>
-              </a:ext>
-            </a:extLst>
-          </p:cNvPr>
-          <p:cNvSpPr/>
-          <p:nvPr/>
-        </p:nvSpPr>
-        <p:spPr>
-          <a:xfrm>
-            <a:off x="1224000" y="4179856"/>
-            <a:ext cx="5590492" cy="617296"/>
+            <a:off x="1213839" y="2039180"/>
+            <a:ext cx="776117" cy="729336"/>
           </a:xfrm>
           <a:prstGeom prst="rect">
             <a:avLst/>
@@ -23133,7 +22824,7 @@
         </p:blipFill>
         <p:spPr>
           <a:xfrm>
-            <a:off x="1110554" y="1817009"/>
+            <a:off x="1110552" y="1705173"/>
             <a:ext cx="10582275" cy="1133475"/>
           </a:xfrm>
           <a:prstGeom prst="rect">
@@ -23160,7 +22851,7 @@
           </p:cNvPicPr>
           <p:nvPr/>
         </p:nvPicPr>
-        <p:blipFill>
+        <p:blipFill rotWithShape="1">
           <a:blip r:embed="rId5">
             <a:extLst>
               <a:ext uri="{28A0092B-C50C-407E-A947-70E740481C1C}">
@@ -23168,14 +22859,13 @@
               </a:ext>
             </a:extLst>
           </a:blip>
-          <a:stretch>
-            <a:fillRect/>
-          </a:stretch>
+          <a:srcRect t="19296"/>
+          <a:stretch/>
         </p:blipFill>
         <p:spPr>
           <a:xfrm>
-            <a:off x="862555" y="2971115"/>
-            <a:ext cx="11078271" cy="1693852"/>
+            <a:off x="862553" y="2945271"/>
+            <a:ext cx="11078271" cy="1367007"/>
           </a:xfrm>
           <a:prstGeom prst="rect">
             <a:avLst/>
@@ -23184,10 +22874,10 @@
       </p:pic>
       <p:pic>
         <p:nvPicPr>
-          <p:cNvPr id="18" name="Grafik 17">
+          <p:cNvPr id="22" name="Grafik 21">
             <a:extLst>
               <a:ext uri="{FF2B5EF4-FFF2-40B4-BE49-F238E27FC236}">
-                <a16:creationId xmlns:a16="http://schemas.microsoft.com/office/drawing/2014/main" id="{77A7F7F1-349B-4F97-8BBD-67012B51B053}"/>
+                <a16:creationId xmlns:a16="http://schemas.microsoft.com/office/drawing/2014/main" id="{03A9BEC7-933E-4EB3-A5C5-F1869E628477}"/>
               </a:ext>
             </a:extLst>
           </p:cNvPr>
@@ -23210,79 +22900,7 @@
         </p:blipFill>
         <p:spPr>
           <a:xfrm>
-            <a:off x="989905" y="1502003"/>
-            <a:ext cx="10702924" cy="544696"/>
-          </a:xfrm>
-          <a:prstGeom prst="rect">
-            <a:avLst/>
-          </a:prstGeom>
-        </p:spPr>
-      </p:pic>
-      <p:pic>
-        <p:nvPicPr>
-          <p:cNvPr id="20" name="Grafik 19">
-            <a:extLst>
-              <a:ext uri="{FF2B5EF4-FFF2-40B4-BE49-F238E27FC236}">
-                <a16:creationId xmlns:a16="http://schemas.microsoft.com/office/drawing/2014/main" id="{90EEFFB5-DDB7-4C59-B116-01081D4738A9}"/>
-              </a:ext>
-            </a:extLst>
-          </p:cNvPr>
-          <p:cNvPicPr>
-            <a:picLocks noChangeAspect="1"/>
-          </p:cNvPicPr>
-          <p:nvPr/>
-        </p:nvPicPr>
-        <p:blipFill>
-          <a:blip r:embed="rId7">
-            <a:extLst>
-              <a:ext uri="{28A0092B-C50C-407E-A947-70E740481C1C}">
-                <a14:useLocalDpi xmlns:a14="http://schemas.microsoft.com/office/drawing/2010/main" val="0"/>
-              </a:ext>
-            </a:extLst>
-          </a:blip>
-          <a:stretch>
-            <a:fillRect/>
-          </a:stretch>
-        </p:blipFill>
-        <p:spPr>
-          <a:xfrm>
-            <a:off x="2710036" y="2392650"/>
-            <a:ext cx="6581775" cy="914400"/>
-          </a:xfrm>
-          <a:prstGeom prst="rect">
-            <a:avLst/>
-          </a:prstGeom>
-        </p:spPr>
-      </p:pic>
-      <p:pic>
-        <p:nvPicPr>
-          <p:cNvPr id="22" name="Grafik 21">
-            <a:extLst>
-              <a:ext uri="{FF2B5EF4-FFF2-40B4-BE49-F238E27FC236}">
-                <a16:creationId xmlns:a16="http://schemas.microsoft.com/office/drawing/2014/main" id="{03A9BEC7-933E-4EB3-A5C5-F1869E628477}"/>
-              </a:ext>
-            </a:extLst>
-          </p:cNvPr>
-          <p:cNvPicPr>
-            <a:picLocks noChangeAspect="1"/>
-          </p:cNvPicPr>
-          <p:nvPr/>
-        </p:nvPicPr>
-        <p:blipFill>
-          <a:blip r:embed="rId8">
-            <a:extLst>
-              <a:ext uri="{28A0092B-C50C-407E-A947-70E740481C1C}">
-                <a14:useLocalDpi xmlns:a14="http://schemas.microsoft.com/office/drawing/2010/main" val="0"/>
-              </a:ext>
-            </a:extLst>
-          </a:blip>
-          <a:stretch>
-            <a:fillRect/>
-          </a:stretch>
-        </p:blipFill>
-        <p:spPr>
-          <a:xfrm>
-            <a:off x="570247" y="5245998"/>
+            <a:off x="603371" y="5152827"/>
             <a:ext cx="11306175" cy="514350"/>
           </a:xfrm>
           <a:prstGeom prst="rect">
@@ -23670,7 +23288,7 @@
                                           </p:stCondLst>
                                         </p:cTn>
                                         <p:tgtEl>
-                                          <p:spTgt spid="10"/>
+                                          <p:spTgt spid="12"/>
                                         </p:tgtEl>
                                         <p:attrNameLst>
                                           <p:attrName>style.visibility</p:attrName>
@@ -23710,330 +23328,6 @@
                                     <p:set>
                                       <p:cBhvr>
                                         <p:cTn id="38" dur="1" fill="hold">
-                                          <p:stCondLst>
-                                            <p:cond delay="0"/>
-                                          </p:stCondLst>
-                                        </p:cTn>
-                                        <p:tgtEl>
-                                          <p:spTgt spid="18"/>
-                                        </p:tgtEl>
-                                        <p:attrNameLst>
-                                          <p:attrName>style.visibility</p:attrName>
-                                        </p:attrNameLst>
-                                      </p:cBhvr>
-                                      <p:to>
-                                        <p:strVal val="visible"/>
-                                      </p:to>
-                                    </p:set>
-                                  </p:childTnLst>
-                                </p:cTn>
-                              </p:par>
-                            </p:childTnLst>
-                          </p:cTn>
-                        </p:par>
-                      </p:childTnLst>
-                    </p:cTn>
-                  </p:par>
-                  <p:par>
-                    <p:cTn id="39" fill="hold">
-                      <p:stCondLst>
-                        <p:cond delay="indefinite"/>
-                      </p:stCondLst>
-                      <p:childTnLst>
-                        <p:par>
-                          <p:cTn id="40" fill="hold">
-                            <p:stCondLst>
-                              <p:cond delay="0"/>
-                            </p:stCondLst>
-                            <p:childTnLst>
-                              <p:par>
-                                <p:cTn id="41" presetID="1" presetClass="exit" presetSubtype="0" fill="hold" nodeType="clickEffect">
-                                  <p:stCondLst>
-                                    <p:cond delay="0"/>
-                                  </p:stCondLst>
-                                  <p:childTnLst>
-                                    <p:set>
-                                      <p:cBhvr>
-                                        <p:cTn id="42" dur="1" fill="hold">
-                                          <p:stCondLst>
-                                            <p:cond delay="0"/>
-                                          </p:stCondLst>
-                                        </p:cTn>
-                                        <p:tgtEl>
-                                          <p:spTgt spid="18"/>
-                                        </p:tgtEl>
-                                        <p:attrNameLst>
-                                          <p:attrName>style.visibility</p:attrName>
-                                        </p:attrNameLst>
-                                      </p:cBhvr>
-                                      <p:to>
-                                        <p:strVal val="hidden"/>
-                                      </p:to>
-                                    </p:set>
-                                  </p:childTnLst>
-                                </p:cTn>
-                              </p:par>
-                              <p:par>
-                                <p:cTn id="43" presetID="1" presetClass="exit" presetSubtype="0" fill="hold" grpId="1" nodeType="withEffect">
-                                  <p:stCondLst>
-                                    <p:cond delay="0"/>
-                                  </p:stCondLst>
-                                  <p:childTnLst>
-                                    <p:set>
-                                      <p:cBhvr>
-                                        <p:cTn id="44" dur="1" fill="hold">
-                                          <p:stCondLst>
-                                            <p:cond delay="0"/>
-                                          </p:stCondLst>
-                                        </p:cTn>
-                                        <p:tgtEl>
-                                          <p:spTgt spid="10"/>
-                                        </p:tgtEl>
-                                        <p:attrNameLst>
-                                          <p:attrName>style.visibility</p:attrName>
-                                        </p:attrNameLst>
-                                      </p:cBhvr>
-                                      <p:to>
-                                        <p:strVal val="hidden"/>
-                                      </p:to>
-                                    </p:set>
-                                  </p:childTnLst>
-                                </p:cTn>
-                              </p:par>
-                            </p:childTnLst>
-                          </p:cTn>
-                        </p:par>
-                      </p:childTnLst>
-                    </p:cTn>
-                  </p:par>
-                  <p:par>
-                    <p:cTn id="45" fill="hold">
-                      <p:stCondLst>
-                        <p:cond delay="indefinite"/>
-                      </p:stCondLst>
-                      <p:childTnLst>
-                        <p:par>
-                          <p:cTn id="46" fill="hold">
-                            <p:stCondLst>
-                              <p:cond delay="0"/>
-                            </p:stCondLst>
-                            <p:childTnLst>
-                              <p:par>
-                                <p:cTn id="47" presetID="1" presetClass="entr" presetSubtype="0" fill="hold" grpId="0" nodeType="clickEffect">
-                                  <p:stCondLst>
-                                    <p:cond delay="0"/>
-                                  </p:stCondLst>
-                                  <p:childTnLst>
-                                    <p:set>
-                                      <p:cBhvr>
-                                        <p:cTn id="48" dur="1" fill="hold">
-                                          <p:stCondLst>
-                                            <p:cond delay="0"/>
-                                          </p:stCondLst>
-                                        </p:cTn>
-                                        <p:tgtEl>
-                                          <p:spTgt spid="11"/>
-                                        </p:tgtEl>
-                                        <p:attrNameLst>
-                                          <p:attrName>style.visibility</p:attrName>
-                                        </p:attrNameLst>
-                                      </p:cBhvr>
-                                      <p:to>
-                                        <p:strVal val="visible"/>
-                                      </p:to>
-                                    </p:set>
-                                  </p:childTnLst>
-                                </p:cTn>
-                              </p:par>
-                            </p:childTnLst>
-                          </p:cTn>
-                        </p:par>
-                      </p:childTnLst>
-                    </p:cTn>
-                  </p:par>
-                  <p:par>
-                    <p:cTn id="49" fill="hold">
-                      <p:stCondLst>
-                        <p:cond delay="indefinite"/>
-                      </p:stCondLst>
-                      <p:childTnLst>
-                        <p:par>
-                          <p:cTn id="50" fill="hold">
-                            <p:stCondLst>
-                              <p:cond delay="0"/>
-                            </p:stCondLst>
-                            <p:childTnLst>
-                              <p:par>
-                                <p:cTn id="51" presetID="1" presetClass="entr" presetSubtype="0" fill="hold" nodeType="clickEffect">
-                                  <p:stCondLst>
-                                    <p:cond delay="0"/>
-                                  </p:stCondLst>
-                                  <p:childTnLst>
-                                    <p:set>
-                                      <p:cBhvr>
-                                        <p:cTn id="52" dur="1" fill="hold">
-                                          <p:stCondLst>
-                                            <p:cond delay="0"/>
-                                          </p:stCondLst>
-                                        </p:cTn>
-                                        <p:tgtEl>
-                                          <p:spTgt spid="20"/>
-                                        </p:tgtEl>
-                                        <p:attrNameLst>
-                                          <p:attrName>style.visibility</p:attrName>
-                                        </p:attrNameLst>
-                                      </p:cBhvr>
-                                      <p:to>
-                                        <p:strVal val="visible"/>
-                                      </p:to>
-                                    </p:set>
-                                  </p:childTnLst>
-                                </p:cTn>
-                              </p:par>
-                            </p:childTnLst>
-                          </p:cTn>
-                        </p:par>
-                      </p:childTnLst>
-                    </p:cTn>
-                  </p:par>
-                  <p:par>
-                    <p:cTn id="53" fill="hold">
-                      <p:stCondLst>
-                        <p:cond delay="indefinite"/>
-                      </p:stCondLst>
-                      <p:childTnLst>
-                        <p:par>
-                          <p:cTn id="54" fill="hold">
-                            <p:stCondLst>
-                              <p:cond delay="0"/>
-                            </p:stCondLst>
-                            <p:childTnLst>
-                              <p:par>
-                                <p:cTn id="55" presetID="1" presetClass="exit" presetSubtype="0" fill="hold" nodeType="clickEffect">
-                                  <p:stCondLst>
-                                    <p:cond delay="0"/>
-                                  </p:stCondLst>
-                                  <p:childTnLst>
-                                    <p:set>
-                                      <p:cBhvr>
-                                        <p:cTn id="56" dur="1" fill="hold">
-                                          <p:stCondLst>
-                                            <p:cond delay="0"/>
-                                          </p:stCondLst>
-                                        </p:cTn>
-                                        <p:tgtEl>
-                                          <p:spTgt spid="20"/>
-                                        </p:tgtEl>
-                                        <p:attrNameLst>
-                                          <p:attrName>style.visibility</p:attrName>
-                                        </p:attrNameLst>
-                                      </p:cBhvr>
-                                      <p:to>
-                                        <p:strVal val="hidden"/>
-                                      </p:to>
-                                    </p:set>
-                                  </p:childTnLst>
-                                </p:cTn>
-                              </p:par>
-                              <p:par>
-                                <p:cTn id="57" presetID="1" presetClass="exit" presetSubtype="0" fill="hold" grpId="1" nodeType="withEffect">
-                                  <p:stCondLst>
-                                    <p:cond delay="0"/>
-                                  </p:stCondLst>
-                                  <p:childTnLst>
-                                    <p:set>
-                                      <p:cBhvr>
-                                        <p:cTn id="58" dur="1" fill="hold">
-                                          <p:stCondLst>
-                                            <p:cond delay="0"/>
-                                          </p:stCondLst>
-                                        </p:cTn>
-                                        <p:tgtEl>
-                                          <p:spTgt spid="11"/>
-                                        </p:tgtEl>
-                                        <p:attrNameLst>
-                                          <p:attrName>style.visibility</p:attrName>
-                                        </p:attrNameLst>
-                                      </p:cBhvr>
-                                      <p:to>
-                                        <p:strVal val="hidden"/>
-                                      </p:to>
-                                    </p:set>
-                                  </p:childTnLst>
-                                </p:cTn>
-                              </p:par>
-                            </p:childTnLst>
-                          </p:cTn>
-                        </p:par>
-                      </p:childTnLst>
-                    </p:cTn>
-                  </p:par>
-                  <p:par>
-                    <p:cTn id="59" fill="hold">
-                      <p:stCondLst>
-                        <p:cond delay="indefinite"/>
-                      </p:stCondLst>
-                      <p:childTnLst>
-                        <p:par>
-                          <p:cTn id="60" fill="hold">
-                            <p:stCondLst>
-                              <p:cond delay="0"/>
-                            </p:stCondLst>
-                            <p:childTnLst>
-                              <p:par>
-                                <p:cTn id="61" presetID="1" presetClass="entr" presetSubtype="0" fill="hold" grpId="0" nodeType="clickEffect">
-                                  <p:stCondLst>
-                                    <p:cond delay="0"/>
-                                  </p:stCondLst>
-                                  <p:childTnLst>
-                                    <p:set>
-                                      <p:cBhvr>
-                                        <p:cTn id="62" dur="1" fill="hold">
-                                          <p:stCondLst>
-                                            <p:cond delay="0"/>
-                                          </p:stCondLst>
-                                        </p:cTn>
-                                        <p:tgtEl>
-                                          <p:spTgt spid="12"/>
-                                        </p:tgtEl>
-                                        <p:attrNameLst>
-                                          <p:attrName>style.visibility</p:attrName>
-                                        </p:attrNameLst>
-                                      </p:cBhvr>
-                                      <p:to>
-                                        <p:strVal val="visible"/>
-                                      </p:to>
-                                    </p:set>
-                                  </p:childTnLst>
-                                </p:cTn>
-                              </p:par>
-                            </p:childTnLst>
-                          </p:cTn>
-                        </p:par>
-                      </p:childTnLst>
-                    </p:cTn>
-                  </p:par>
-                  <p:par>
-                    <p:cTn id="63" fill="hold">
-                      <p:stCondLst>
-                        <p:cond delay="indefinite"/>
-                      </p:stCondLst>
-                      <p:childTnLst>
-                        <p:par>
-                          <p:cTn id="64" fill="hold">
-                            <p:stCondLst>
-                              <p:cond delay="0"/>
-                            </p:stCondLst>
-                            <p:childTnLst>
-                              <p:par>
-                                <p:cTn id="65" presetID="1" presetClass="entr" presetSubtype="0" fill="hold" nodeType="clickEffect">
-                                  <p:stCondLst>
-                                    <p:cond delay="0"/>
-                                  </p:stCondLst>
-                                  <p:childTnLst>
-                                    <p:set>
-                                      <p:cBhvr>
-                                        <p:cTn id="66" dur="1" fill="hold">
                                           <p:stCondLst>
                                             <p:cond delay="0"/>
                                           </p:stCondLst>
@@ -24084,17 +23378,13 @@
       <p:bldP spid="8" grpId="1" animBg="1"/>
       <p:bldP spid="9" grpId="0" animBg="1"/>
       <p:bldP spid="9" grpId="1" animBg="1"/>
-      <p:bldP spid="10" grpId="0" animBg="1"/>
-      <p:bldP spid="10" grpId="1" animBg="1"/>
-      <p:bldP spid="11" grpId="0" animBg="1"/>
-      <p:bldP spid="11" grpId="1" animBg="1"/>
       <p:bldP spid="12" grpId="0" animBg="1"/>
     </p:bldLst>
   </p:timing>
 </p:sld>
 </file>
 
-<file path=ppt/slides/slide12.xml><?xml version="1.0" encoding="utf-8"?>
+<file path=ppt/slides/slide11.xml><?xml version="1.0" encoding="utf-8"?>
 <p:sld xmlns:a="http://schemas.openxmlformats.org/drawingml/2006/main" xmlns:r="http://schemas.openxmlformats.org/officeDocument/2006/relationships" xmlns:p="http://schemas.openxmlformats.org/presentationml/2006/main">
   <p:cSld>
     <p:spTree>
@@ -24193,7 +23483,7 @@
             <a:pPr rtl="0"/>
             <a:fld id="{C014DD1E-5D91-48A3-AD6D-45FBA980D106}" type="slidenum">
               <a:rPr lang="de-DE" smtClean="0"/>
-              <a:t>12</a:t>
+              <a:t>11</a:t>
             </a:fld>
             <a:endParaRPr lang="de-DE" dirty="0"/>
           </a:p>
@@ -24201,10 +23491,10 @@
       </p:sp>
       <p:pic>
         <p:nvPicPr>
-          <p:cNvPr id="15" name="Grafik 14">
+          <p:cNvPr id="5" name="Grafik 4">
             <a:extLst>
               <a:ext uri="{FF2B5EF4-FFF2-40B4-BE49-F238E27FC236}">
-                <a16:creationId xmlns:a16="http://schemas.microsoft.com/office/drawing/2014/main" id="{3F283B78-CCA9-4883-8EE8-F020EA0B5D3F}"/>
+                <a16:creationId xmlns:a16="http://schemas.microsoft.com/office/drawing/2014/main" id="{C2BB67BE-AD49-40C7-AF89-9538CE9A49F3}"/>
               </a:ext>
             </a:extLst>
           </p:cNvPr>
@@ -24221,8 +23511,8 @@
         </p:blipFill>
         <p:spPr>
           <a:xfrm>
-            <a:off x="837828" y="1196752"/>
-            <a:ext cx="10879265" cy="4248472"/>
+            <a:off x="623872" y="1520788"/>
+            <a:ext cx="10941080" cy="3816424"/>
           </a:xfrm>
           <a:prstGeom prst="rect">
             <a:avLst/>
@@ -24254,7 +23544,7 @@
 </p:sld>
 </file>
 
-<file path=ppt/slides/slide13.xml><?xml version="1.0" encoding="utf-8"?>
+<file path=ppt/slides/slide12.xml><?xml version="1.0" encoding="utf-8"?>
 <p:sld xmlns:a="http://schemas.openxmlformats.org/drawingml/2006/main" xmlns:r="http://schemas.openxmlformats.org/officeDocument/2006/relationships" xmlns:p="http://schemas.openxmlformats.org/presentationml/2006/main">
   <p:cSld>
     <p:spTree>
@@ -24323,7 +23613,7 @@
         </p:blipFill>
         <p:spPr>
           <a:xfrm>
-            <a:off x="981844" y="1556792"/>
+            <a:off x="874039" y="1222320"/>
             <a:ext cx="11060421" cy="4413360"/>
           </a:xfrm>
           <a:prstGeom prst="rect">
@@ -24385,7 +23675,7 @@
             <a:pPr rtl="0"/>
             <a:fld id="{C014DD1E-5D91-48A3-AD6D-45FBA980D106}" type="slidenum">
               <a:rPr lang="de-DE" smtClean="0"/>
-              <a:t>13</a:t>
+              <a:t>12</a:t>
             </a:fld>
             <a:endParaRPr lang="de-DE" dirty="0"/>
           </a:p>
@@ -24416,7 +23706,7 @@
 </p:sld>
 </file>
 
-<file path=ppt/slides/slide14.xml><?xml version="1.0" encoding="utf-8"?>
+<file path=ppt/slides/slide13.xml><?xml version="1.0" encoding="utf-8"?>
 <p:sld xmlns:a="http://schemas.openxmlformats.org/drawingml/2006/main" xmlns:r="http://schemas.openxmlformats.org/officeDocument/2006/relationships" xmlns:p="http://schemas.openxmlformats.org/presentationml/2006/main">
   <p:cSld>
     <p:spTree>
@@ -24517,7 +23807,7 @@
             <a:pPr rtl="0"/>
             <a:fld id="{C014DD1E-5D91-48A3-AD6D-45FBA980D106}" type="slidenum">
               <a:rPr lang="de-DE" smtClean="0"/>
-              <a:t>14</a:t>
+              <a:t>13</a:t>
             </a:fld>
             <a:endParaRPr lang="de-DE" dirty="0"/>
           </a:p>
@@ -24536,7 +23826,7 @@
           <p:nvPr>
             <p:extLst>
               <p:ext uri="{D42A27DB-BD31-4B8C-83A1-F6EECF244321}">
-                <p14:modId xmlns:p14="http://schemas.microsoft.com/office/powerpoint/2010/main" val="2235510163"/>
+                <p14:modId xmlns:p14="http://schemas.microsoft.com/office/powerpoint/2010/main" val="1014512270"/>
               </p:ext>
             </p:extLst>
           </p:nvPr>
@@ -24573,6 +23863,642 @@
       </p:transition>
     </mc:Fallback>
   </mc:AlternateContent>
+</p:sld>
+</file>
+
+<file path=ppt/slides/slide14.xml><?xml version="1.0" encoding="utf-8"?>
+<p:sld xmlns:a="http://schemas.openxmlformats.org/drawingml/2006/main" xmlns:r="http://schemas.openxmlformats.org/officeDocument/2006/relationships" xmlns:p="http://schemas.openxmlformats.org/presentationml/2006/main">
+  <p:cSld>
+    <p:spTree>
+      <p:nvGrpSpPr>
+        <p:cNvPr id="1" name=""/>
+        <p:cNvGrpSpPr/>
+        <p:nvPr/>
+      </p:nvGrpSpPr>
+      <p:grpSpPr>
+        <a:xfrm>
+          <a:off x="0" y="0"/>
+          <a:ext cx="0" cy="0"/>
+          <a:chOff x="0" y="0"/>
+          <a:chExt cx="0" cy="0"/>
+        </a:xfrm>
+      </p:grpSpPr>
+      <p:sp>
+        <p:nvSpPr>
+          <p:cNvPr id="2" name="Titel 1"/>
+          <p:cNvSpPr>
+            <a:spLocks noGrp="1"/>
+          </p:cNvSpPr>
+          <p:nvPr>
+            <p:ph type="title"/>
+          </p:nvPr>
+        </p:nvSpPr>
+        <p:spPr>
+          <a:xfrm>
+            <a:off x="1224000" y="270000"/>
+            <a:ext cx="10360501" cy="562075"/>
+          </a:xfrm>
+        </p:spPr>
+        <p:txBody>
+          <a:bodyPr rtlCol="0">
+            <a:normAutofit fontScale="90000"/>
+          </a:bodyPr>
+          <a:lstStyle/>
+          <a:p>
+            <a:pPr algn="ctr"/>
+            <a:r>
+              <a:rPr lang="de-DE" dirty="0"/>
+              <a:t>Soll-/Ist-Vergleich – Anforderungen</a:t>
+            </a:r>
+          </a:p>
+        </p:txBody>
+      </p:sp>
+      <p:sp>
+        <p:nvSpPr>
+          <p:cNvPr id="3" name="Inhaltsplatzhalter 2">
+            <a:extLst>
+              <a:ext uri="{FF2B5EF4-FFF2-40B4-BE49-F238E27FC236}">
+                <a16:creationId xmlns:a16="http://schemas.microsoft.com/office/drawing/2014/main" id="{2354811B-43F9-4706-B744-6E7350D7DE39}"/>
+              </a:ext>
+            </a:extLst>
+          </p:cNvPr>
+          <p:cNvSpPr>
+            <a:spLocks noGrp="1"/>
+          </p:cNvSpPr>
+          <p:nvPr>
+            <p:ph idx="1"/>
+          </p:nvPr>
+        </p:nvSpPr>
+        <p:spPr>
+          <a:xfrm>
+            <a:off x="1218883" y="908719"/>
+            <a:ext cx="10360501" cy="5255349"/>
+          </a:xfrm>
+        </p:spPr>
+        <p:txBody>
+          <a:bodyPr/>
+          <a:lstStyle/>
+          <a:p>
+            <a:r>
+              <a:rPr lang="de-DE" dirty="0"/>
+              <a:t>Projekt aus der c‘t lauffähig machen</a:t>
+            </a:r>
+          </a:p>
+          <a:p>
+            <a:endParaRPr lang="de-DE" dirty="0"/>
+          </a:p>
+          <a:p>
+            <a:r>
+              <a:rPr lang="de-DE" dirty="0"/>
+              <a:t>eigene Texte hinzufügen können</a:t>
+            </a:r>
+          </a:p>
+          <a:p>
+            <a:endParaRPr lang="de-DE" dirty="0"/>
+          </a:p>
+          <a:p>
+            <a:r>
+              <a:rPr lang="de-DE" dirty="0"/>
+              <a:t>schnelle Verarbeitung der eingegebenen Texte</a:t>
+            </a:r>
+          </a:p>
+          <a:p>
+            <a:endParaRPr lang="de-DE" dirty="0"/>
+          </a:p>
+          <a:p>
+            <a:r>
+              <a:rPr lang="de-DE" dirty="0"/>
+              <a:t>Umsetzung in C oder Java (optional)</a:t>
+            </a:r>
+          </a:p>
+          <a:p>
+            <a:endParaRPr lang="de-DE" dirty="0"/>
+          </a:p>
+          <a:p>
+            <a:r>
+              <a:rPr lang="de-DE" dirty="0"/>
+              <a:t>modulare Entwicklung &amp; Kommentare</a:t>
+            </a:r>
+          </a:p>
+        </p:txBody>
+      </p:sp>
+      <p:sp>
+        <p:nvSpPr>
+          <p:cNvPr id="4" name="Fußzeilenplatzhalter 3">
+            <a:extLst>
+              <a:ext uri="{FF2B5EF4-FFF2-40B4-BE49-F238E27FC236}">
+                <a16:creationId xmlns:a16="http://schemas.microsoft.com/office/drawing/2014/main" id="{1E8F8C7F-00C3-4E0D-BD50-E1FC2480992F}"/>
+              </a:ext>
+            </a:extLst>
+          </p:cNvPr>
+          <p:cNvSpPr>
+            <a:spLocks noGrp="1"/>
+          </p:cNvSpPr>
+          <p:nvPr>
+            <p:ph type="ftr" sz="quarter" idx="11"/>
+          </p:nvPr>
+        </p:nvSpPr>
+        <p:spPr/>
+        <p:txBody>
+          <a:bodyPr/>
+          <a:lstStyle/>
+          <a:p>
+            <a:pPr rtl="0"/>
+            <a:r>
+              <a:rPr lang="de-DE"/>
+              <a:t>Jan-Philipp Töberg / Projektarbeit SS18</a:t>
+            </a:r>
+            <a:endParaRPr lang="de-DE" dirty="0"/>
+          </a:p>
+        </p:txBody>
+      </p:sp>
+      <p:sp>
+        <p:nvSpPr>
+          <p:cNvPr id="6" name="Foliennummernplatzhalter 5">
+            <a:extLst>
+              <a:ext uri="{FF2B5EF4-FFF2-40B4-BE49-F238E27FC236}">
+                <a16:creationId xmlns:a16="http://schemas.microsoft.com/office/drawing/2014/main" id="{2C10D558-D758-43BA-8345-AC431D702023}"/>
+              </a:ext>
+            </a:extLst>
+          </p:cNvPr>
+          <p:cNvSpPr>
+            <a:spLocks noGrp="1"/>
+          </p:cNvSpPr>
+          <p:nvPr>
+            <p:ph type="sldNum" sz="quarter" idx="12"/>
+          </p:nvPr>
+        </p:nvSpPr>
+        <p:spPr/>
+        <p:txBody>
+          <a:bodyPr/>
+          <a:lstStyle/>
+          <a:p>
+            <a:pPr rtl="0"/>
+            <a:fld id="{C014DD1E-5D91-48A3-AD6D-45FBA980D106}" type="slidenum">
+              <a:rPr lang="de-DE" smtClean="0"/>
+              <a:t>14</a:t>
+            </a:fld>
+            <a:endParaRPr lang="de-DE" dirty="0"/>
+          </a:p>
+        </p:txBody>
+      </p:sp>
+      <p:pic>
+        <p:nvPicPr>
+          <p:cNvPr id="7" name="Grafik 6">
+            <a:extLst>
+              <a:ext uri="{FF2B5EF4-FFF2-40B4-BE49-F238E27FC236}">
+                <a16:creationId xmlns:a16="http://schemas.microsoft.com/office/drawing/2014/main" id="{055F1487-3993-4E90-B7FB-BF752E5A6482}"/>
+              </a:ext>
+            </a:extLst>
+          </p:cNvPr>
+          <p:cNvPicPr>
+            <a:picLocks noChangeAspect="1"/>
+          </p:cNvPicPr>
+          <p:nvPr/>
+        </p:nvPicPr>
+        <p:blipFill>
+          <a:blip r:embed="rId3">
+            <a:extLst>
+              <a:ext uri="{28A0092B-C50C-407E-A947-70E740481C1C}">
+                <a14:useLocalDpi xmlns:a14="http://schemas.microsoft.com/office/drawing/2010/main" val="0"/>
+              </a:ext>
+            </a:extLst>
+          </a:blip>
+          <a:stretch>
+            <a:fillRect/>
+          </a:stretch>
+        </p:blipFill>
+        <p:spPr>
+          <a:xfrm>
+            <a:off x="6958508" y="693932"/>
+            <a:ext cx="680383" cy="792088"/>
+          </a:xfrm>
+          <a:prstGeom prst="rect">
+            <a:avLst/>
+          </a:prstGeom>
+        </p:spPr>
+      </p:pic>
+      <p:pic>
+        <p:nvPicPr>
+          <p:cNvPr id="8" name="Grafik 7">
+            <a:extLst>
+              <a:ext uri="{FF2B5EF4-FFF2-40B4-BE49-F238E27FC236}">
+                <a16:creationId xmlns:a16="http://schemas.microsoft.com/office/drawing/2014/main" id="{7565839A-A9B8-431B-B1C9-DA548D267943}"/>
+              </a:ext>
+            </a:extLst>
+          </p:cNvPr>
+          <p:cNvPicPr>
+            <a:picLocks noChangeAspect="1"/>
+          </p:cNvPicPr>
+          <p:nvPr/>
+        </p:nvPicPr>
+        <p:blipFill>
+          <a:blip r:embed="rId3">
+            <a:extLst>
+              <a:ext uri="{28A0092B-C50C-407E-A947-70E740481C1C}">
+                <a14:useLocalDpi xmlns:a14="http://schemas.microsoft.com/office/drawing/2010/main" val="0"/>
+              </a:ext>
+            </a:extLst>
+          </a:blip>
+          <a:stretch>
+            <a:fillRect/>
+          </a:stretch>
+        </p:blipFill>
+        <p:spPr>
+          <a:xfrm>
+            <a:off x="6413834" y="1764257"/>
+            <a:ext cx="680383" cy="792088"/>
+          </a:xfrm>
+          <a:prstGeom prst="rect">
+            <a:avLst/>
+          </a:prstGeom>
+        </p:spPr>
+      </p:pic>
+      <p:pic>
+        <p:nvPicPr>
+          <p:cNvPr id="9" name="Grafik 8">
+            <a:extLst>
+              <a:ext uri="{FF2B5EF4-FFF2-40B4-BE49-F238E27FC236}">
+                <a16:creationId xmlns:a16="http://schemas.microsoft.com/office/drawing/2014/main" id="{A8361625-1402-49D0-B50A-738384856755}"/>
+              </a:ext>
+            </a:extLst>
+          </p:cNvPr>
+          <p:cNvPicPr>
+            <a:picLocks noChangeAspect="1"/>
+          </p:cNvPicPr>
+          <p:nvPr/>
+        </p:nvPicPr>
+        <p:blipFill>
+          <a:blip r:embed="rId3">
+            <a:extLst>
+              <a:ext uri="{28A0092B-C50C-407E-A947-70E740481C1C}">
+                <a14:useLocalDpi xmlns:a14="http://schemas.microsoft.com/office/drawing/2010/main" val="0"/>
+              </a:ext>
+            </a:extLst>
+          </a:blip>
+          <a:stretch>
+            <a:fillRect/>
+          </a:stretch>
+        </p:blipFill>
+        <p:spPr>
+          <a:xfrm>
+            <a:off x="7298699" y="5371980"/>
+            <a:ext cx="680383" cy="792088"/>
+          </a:xfrm>
+          <a:prstGeom prst="rect">
+            <a:avLst/>
+          </a:prstGeom>
+        </p:spPr>
+      </p:pic>
+      <p:pic>
+        <p:nvPicPr>
+          <p:cNvPr id="10" name="Grafik 9">
+            <a:extLst>
+              <a:ext uri="{FF2B5EF4-FFF2-40B4-BE49-F238E27FC236}">
+                <a16:creationId xmlns:a16="http://schemas.microsoft.com/office/drawing/2014/main" id="{4ABB9B78-EA30-451B-9F8B-15FCF2ED95A0}"/>
+              </a:ext>
+            </a:extLst>
+          </p:cNvPr>
+          <p:cNvPicPr>
+            <a:picLocks noChangeAspect="1"/>
+          </p:cNvPicPr>
+          <p:nvPr/>
+        </p:nvPicPr>
+        <p:blipFill>
+          <a:blip r:embed="rId4" cstate="print">
+            <a:extLst>
+              <a:ext uri="{28A0092B-C50C-407E-A947-70E740481C1C}">
+                <a14:useLocalDpi xmlns:a14="http://schemas.microsoft.com/office/drawing/2010/main" val="0"/>
+              </a:ext>
+            </a:extLst>
+          </a:blip>
+          <a:stretch>
+            <a:fillRect/>
+          </a:stretch>
+        </p:blipFill>
+        <p:spPr>
+          <a:xfrm>
+            <a:off x="6754026" y="4405201"/>
+            <a:ext cx="625668" cy="625668"/>
+          </a:xfrm>
+          <a:prstGeom prst="rect">
+            <a:avLst/>
+          </a:prstGeom>
+        </p:spPr>
+      </p:pic>
+      <p:pic>
+        <p:nvPicPr>
+          <p:cNvPr id="13" name="Grafik 12">
+            <a:extLst>
+              <a:ext uri="{FF2B5EF4-FFF2-40B4-BE49-F238E27FC236}">
+                <a16:creationId xmlns:a16="http://schemas.microsoft.com/office/drawing/2014/main" id="{C67E35BB-D486-4549-AFEE-59886569A3AC}"/>
+              </a:ext>
+            </a:extLst>
+          </p:cNvPr>
+          <p:cNvPicPr>
+            <a:picLocks noChangeAspect="1"/>
+          </p:cNvPicPr>
+          <p:nvPr/>
+        </p:nvPicPr>
+        <p:blipFill>
+          <a:blip r:embed="rId5" cstate="print">
+            <a:extLst>
+              <a:ext uri="{28A0092B-C50C-407E-A947-70E740481C1C}">
+                <a14:useLocalDpi xmlns:a14="http://schemas.microsoft.com/office/drawing/2010/main" val="0"/>
+              </a:ext>
+            </a:extLst>
+          </a:blip>
+          <a:stretch>
+            <a:fillRect/>
+          </a:stretch>
+        </p:blipFill>
+        <p:spPr>
+          <a:xfrm>
+            <a:off x="8470676" y="3087022"/>
+            <a:ext cx="680383" cy="683956"/>
+          </a:xfrm>
+          <a:prstGeom prst="rect">
+            <a:avLst/>
+          </a:prstGeom>
+        </p:spPr>
+      </p:pic>
+    </p:spTree>
+    <p:extLst>
+      <p:ext uri="{BB962C8B-B14F-4D97-AF65-F5344CB8AC3E}">
+        <p14:creationId xmlns:p14="http://schemas.microsoft.com/office/powerpoint/2010/main" val="583030162"/>
+      </p:ext>
+    </p:extLst>
+  </p:cSld>
+  <p:clrMapOvr>
+    <a:masterClrMapping/>
+  </p:clrMapOvr>
+  <mc:AlternateContent xmlns:mc="http://schemas.openxmlformats.org/markup-compatibility/2006" xmlns:p14="http://schemas.microsoft.com/office/powerpoint/2010/main">
+    <mc:Choice Requires="p14">
+      <p:transition spd="med" p14:dur="700">
+        <p:fade/>
+      </p:transition>
+    </mc:Choice>
+    <mc:Fallback xmlns="">
+      <p:transition spd="med">
+        <p:fade/>
+      </p:transition>
+    </mc:Fallback>
+  </mc:AlternateContent>
+  <p:timing>
+    <p:tnLst>
+      <p:par>
+        <p:cTn id="1" dur="indefinite" restart="never" nodeType="tmRoot">
+          <p:childTnLst>
+            <p:seq concurrent="1" nextAc="seek">
+              <p:cTn id="2" dur="indefinite" nodeType="mainSeq">
+                <p:childTnLst>
+                  <p:par>
+                    <p:cTn id="3" fill="hold">
+                      <p:stCondLst>
+                        <p:cond delay="indefinite"/>
+                      </p:stCondLst>
+                      <p:childTnLst>
+                        <p:par>
+                          <p:cTn id="4" fill="hold">
+                            <p:stCondLst>
+                              <p:cond delay="0"/>
+                            </p:stCondLst>
+                            <p:childTnLst>
+                              <p:par>
+                                <p:cTn id="5" presetID="1" presetClass="entr" presetSubtype="0" fill="hold" nodeType="clickEffect">
+                                  <p:stCondLst>
+                                    <p:cond delay="0"/>
+                                  </p:stCondLst>
+                                  <p:childTnLst>
+                                    <p:set>
+                                      <p:cBhvr>
+                                        <p:cTn id="6" dur="1" fill="hold">
+                                          <p:stCondLst>
+                                            <p:cond delay="0"/>
+                                          </p:stCondLst>
+                                        </p:cTn>
+                                        <p:tgtEl>
+                                          <p:spTgt spid="7"/>
+                                        </p:tgtEl>
+                                        <p:attrNameLst>
+                                          <p:attrName>style.visibility</p:attrName>
+                                        </p:attrNameLst>
+                                      </p:cBhvr>
+                                      <p:to>
+                                        <p:strVal val="visible"/>
+                                      </p:to>
+                                    </p:set>
+                                  </p:childTnLst>
+                                </p:cTn>
+                              </p:par>
+                            </p:childTnLst>
+                          </p:cTn>
+                        </p:par>
+                      </p:childTnLst>
+                    </p:cTn>
+                  </p:par>
+                  <p:par>
+                    <p:cTn id="7" fill="hold">
+                      <p:stCondLst>
+                        <p:cond delay="indefinite"/>
+                      </p:stCondLst>
+                      <p:childTnLst>
+                        <p:par>
+                          <p:cTn id="8" fill="hold">
+                            <p:stCondLst>
+                              <p:cond delay="0"/>
+                            </p:stCondLst>
+                            <p:childTnLst>
+                              <p:par>
+                                <p:cTn id="9" presetID="1" presetClass="entr" presetSubtype="0" fill="hold" nodeType="clickEffect">
+                                  <p:stCondLst>
+                                    <p:cond delay="0"/>
+                                  </p:stCondLst>
+                                  <p:childTnLst>
+                                    <p:set>
+                                      <p:cBhvr>
+                                        <p:cTn id="10" dur="1" fill="hold">
+                                          <p:stCondLst>
+                                            <p:cond delay="0"/>
+                                          </p:stCondLst>
+                                        </p:cTn>
+                                        <p:tgtEl>
+                                          <p:spTgt spid="8"/>
+                                        </p:tgtEl>
+                                        <p:attrNameLst>
+                                          <p:attrName>style.visibility</p:attrName>
+                                        </p:attrNameLst>
+                                      </p:cBhvr>
+                                      <p:to>
+                                        <p:strVal val="visible"/>
+                                      </p:to>
+                                    </p:set>
+                                  </p:childTnLst>
+                                </p:cTn>
+                              </p:par>
+                            </p:childTnLst>
+                          </p:cTn>
+                        </p:par>
+                      </p:childTnLst>
+                    </p:cTn>
+                  </p:par>
+                  <p:par>
+                    <p:cTn id="11" fill="hold">
+                      <p:stCondLst>
+                        <p:cond delay="indefinite"/>
+                      </p:stCondLst>
+                      <p:childTnLst>
+                        <p:par>
+                          <p:cTn id="12" fill="hold">
+                            <p:stCondLst>
+                              <p:cond delay="0"/>
+                            </p:stCondLst>
+                            <p:childTnLst>
+                              <p:par>
+                                <p:cTn id="13" presetID="1" presetClass="entr" presetSubtype="0" fill="hold" nodeType="clickEffect">
+                                  <p:stCondLst>
+                                    <p:cond delay="0"/>
+                                  </p:stCondLst>
+                                  <p:childTnLst>
+                                    <p:set>
+                                      <p:cBhvr>
+                                        <p:cTn id="14" dur="1" fill="hold">
+                                          <p:stCondLst>
+                                            <p:cond delay="0"/>
+                                          </p:stCondLst>
+                                        </p:cTn>
+                                        <p:tgtEl>
+                                          <p:spTgt spid="13"/>
+                                        </p:tgtEl>
+                                        <p:attrNameLst>
+                                          <p:attrName>style.visibility</p:attrName>
+                                        </p:attrNameLst>
+                                      </p:cBhvr>
+                                      <p:to>
+                                        <p:strVal val="visible"/>
+                                      </p:to>
+                                    </p:set>
+                                  </p:childTnLst>
+                                </p:cTn>
+                              </p:par>
+                            </p:childTnLst>
+                          </p:cTn>
+                        </p:par>
+                      </p:childTnLst>
+                    </p:cTn>
+                  </p:par>
+                  <p:par>
+                    <p:cTn id="15" fill="hold">
+                      <p:stCondLst>
+                        <p:cond delay="indefinite"/>
+                      </p:stCondLst>
+                      <p:childTnLst>
+                        <p:par>
+                          <p:cTn id="16" fill="hold">
+                            <p:stCondLst>
+                              <p:cond delay="0"/>
+                            </p:stCondLst>
+                            <p:childTnLst>
+                              <p:par>
+                                <p:cTn id="17" presetID="1" presetClass="entr" presetSubtype="0" fill="hold" nodeType="clickEffect">
+                                  <p:stCondLst>
+                                    <p:cond delay="0"/>
+                                  </p:stCondLst>
+                                  <p:childTnLst>
+                                    <p:set>
+                                      <p:cBhvr>
+                                        <p:cTn id="18" dur="1" fill="hold">
+                                          <p:stCondLst>
+                                            <p:cond delay="0"/>
+                                          </p:stCondLst>
+                                        </p:cTn>
+                                        <p:tgtEl>
+                                          <p:spTgt spid="10"/>
+                                        </p:tgtEl>
+                                        <p:attrNameLst>
+                                          <p:attrName>style.visibility</p:attrName>
+                                        </p:attrNameLst>
+                                      </p:cBhvr>
+                                      <p:to>
+                                        <p:strVal val="visible"/>
+                                      </p:to>
+                                    </p:set>
+                                  </p:childTnLst>
+                                </p:cTn>
+                              </p:par>
+                            </p:childTnLst>
+                          </p:cTn>
+                        </p:par>
+                      </p:childTnLst>
+                    </p:cTn>
+                  </p:par>
+                  <p:par>
+                    <p:cTn id="19" fill="hold">
+                      <p:stCondLst>
+                        <p:cond delay="indefinite"/>
+                      </p:stCondLst>
+                      <p:childTnLst>
+                        <p:par>
+                          <p:cTn id="20" fill="hold">
+                            <p:stCondLst>
+                              <p:cond delay="0"/>
+                            </p:stCondLst>
+                            <p:childTnLst>
+                              <p:par>
+                                <p:cTn id="21" presetID="1" presetClass="entr" presetSubtype="0" fill="hold" nodeType="clickEffect">
+                                  <p:stCondLst>
+                                    <p:cond delay="0"/>
+                                  </p:stCondLst>
+                                  <p:childTnLst>
+                                    <p:set>
+                                      <p:cBhvr>
+                                        <p:cTn id="22" dur="1" fill="hold">
+                                          <p:stCondLst>
+                                            <p:cond delay="0"/>
+                                          </p:stCondLst>
+                                        </p:cTn>
+                                        <p:tgtEl>
+                                          <p:spTgt spid="9"/>
+                                        </p:tgtEl>
+                                        <p:attrNameLst>
+                                          <p:attrName>style.visibility</p:attrName>
+                                        </p:attrNameLst>
+                                      </p:cBhvr>
+                                      <p:to>
+                                        <p:strVal val="visible"/>
+                                      </p:to>
+                                    </p:set>
+                                  </p:childTnLst>
+                                </p:cTn>
+                              </p:par>
+                            </p:childTnLst>
+                          </p:cTn>
+                        </p:par>
+                      </p:childTnLst>
+                    </p:cTn>
+                  </p:par>
+                </p:childTnLst>
+              </p:cTn>
+              <p:prevCondLst>
+                <p:cond evt="onPrev" delay="0">
+                  <p:tgtEl>
+                    <p:sldTgt/>
+                  </p:tgtEl>
+                </p:cond>
+              </p:prevCondLst>
+              <p:nextCondLst>
+                <p:cond evt="onNext" delay="0">
+                  <p:tgtEl>
+                    <p:sldTgt/>
+                  </p:tgtEl>
+                </p:cond>
+              </p:nextCondLst>
+            </p:seq>
+          </p:childTnLst>
+        </p:cTn>
+      </p:par>
+    </p:tnLst>
+  </p:timing>
 </p:sld>
 </file>
 
@@ -24850,381 +24776,6 @@
       </p:transition>
     </mc:Fallback>
   </mc:AlternateContent>
-</p:sld>
-</file>
-
-<file path=ppt/slides/slide16.xml><?xml version="1.0" encoding="utf-8"?>
-<p:sld xmlns:a="http://schemas.openxmlformats.org/drawingml/2006/main" xmlns:r="http://schemas.openxmlformats.org/officeDocument/2006/relationships" xmlns:p="http://schemas.openxmlformats.org/presentationml/2006/main">
-  <p:cSld>
-    <p:spTree>
-      <p:nvGrpSpPr>
-        <p:cNvPr id="1" name=""/>
-        <p:cNvGrpSpPr/>
-        <p:nvPr/>
-      </p:nvGrpSpPr>
-      <p:grpSpPr>
-        <a:xfrm>
-          <a:off x="0" y="0"/>
-          <a:ext cx="0" cy="0"/>
-          <a:chOff x="0" y="0"/>
-          <a:chExt cx="0" cy="0"/>
-        </a:xfrm>
-      </p:grpSpPr>
-      <p:sp>
-        <p:nvSpPr>
-          <p:cNvPr id="2" name="Titel 1"/>
-          <p:cNvSpPr>
-            <a:spLocks noGrp="1"/>
-          </p:cNvSpPr>
-          <p:nvPr>
-            <p:ph type="title"/>
-          </p:nvPr>
-        </p:nvSpPr>
-        <p:spPr>
-          <a:xfrm>
-            <a:off x="1224000" y="270000"/>
-            <a:ext cx="10360501" cy="562075"/>
-          </a:xfrm>
-        </p:spPr>
-        <p:txBody>
-          <a:bodyPr rtlCol="0">
-            <a:normAutofit fontScale="90000"/>
-          </a:bodyPr>
-          <a:lstStyle/>
-          <a:p>
-            <a:pPr algn="ctr"/>
-            <a:r>
-              <a:rPr lang="de-DE" dirty="0"/>
-              <a:t>Soll-/Ist-Vergleich – Anforderungen</a:t>
-            </a:r>
-          </a:p>
-        </p:txBody>
-      </p:sp>
-      <p:sp>
-        <p:nvSpPr>
-          <p:cNvPr id="3" name="Inhaltsplatzhalter 2">
-            <a:extLst>
-              <a:ext uri="{FF2B5EF4-FFF2-40B4-BE49-F238E27FC236}">
-                <a16:creationId xmlns:a16="http://schemas.microsoft.com/office/drawing/2014/main" id="{2354811B-43F9-4706-B744-6E7350D7DE39}"/>
-              </a:ext>
-            </a:extLst>
-          </p:cNvPr>
-          <p:cNvSpPr>
-            <a:spLocks noGrp="1"/>
-          </p:cNvSpPr>
-          <p:nvPr>
-            <p:ph idx="1"/>
-          </p:nvPr>
-        </p:nvSpPr>
-        <p:spPr>
-          <a:xfrm>
-            <a:off x="1218883" y="908719"/>
-            <a:ext cx="10360501" cy="5255349"/>
-          </a:xfrm>
-        </p:spPr>
-        <p:txBody>
-          <a:bodyPr/>
-          <a:lstStyle/>
-          <a:p>
-            <a:endParaRPr lang="de-DE" dirty="0"/>
-          </a:p>
-          <a:p>
-            <a:r>
-              <a:rPr lang="de-DE" dirty="0"/>
-              <a:t>Projekt aus der c‘t lauffähig machen</a:t>
-            </a:r>
-          </a:p>
-          <a:p>
-            <a:endParaRPr lang="de-DE" dirty="0"/>
-          </a:p>
-          <a:p>
-            <a:r>
-              <a:rPr lang="de-DE" dirty="0"/>
-              <a:t>eigene Texte hinzufügen können</a:t>
-            </a:r>
-          </a:p>
-          <a:p>
-            <a:endParaRPr lang="de-DE" dirty="0"/>
-          </a:p>
-          <a:p>
-            <a:r>
-              <a:rPr lang="de-DE" dirty="0"/>
-              <a:t>Schnelle Verarbeitung der eingegebenen Texte</a:t>
-            </a:r>
-          </a:p>
-          <a:p>
-            <a:endParaRPr lang="de-DE" dirty="0"/>
-          </a:p>
-          <a:p>
-            <a:r>
-              <a:rPr lang="de-DE" dirty="0"/>
-              <a:t>Umsetzung in C oder Java</a:t>
-            </a:r>
-          </a:p>
-        </p:txBody>
-      </p:sp>
-      <p:sp>
-        <p:nvSpPr>
-          <p:cNvPr id="4" name="Fußzeilenplatzhalter 3">
-            <a:extLst>
-              <a:ext uri="{FF2B5EF4-FFF2-40B4-BE49-F238E27FC236}">
-                <a16:creationId xmlns:a16="http://schemas.microsoft.com/office/drawing/2014/main" id="{1E8F8C7F-00C3-4E0D-BD50-E1FC2480992F}"/>
-              </a:ext>
-            </a:extLst>
-          </p:cNvPr>
-          <p:cNvSpPr>
-            <a:spLocks noGrp="1"/>
-          </p:cNvSpPr>
-          <p:nvPr>
-            <p:ph type="ftr" sz="quarter" idx="11"/>
-          </p:nvPr>
-        </p:nvSpPr>
-        <p:spPr/>
-        <p:txBody>
-          <a:bodyPr/>
-          <a:lstStyle/>
-          <a:p>
-            <a:pPr rtl="0"/>
-            <a:r>
-              <a:rPr lang="de-DE"/>
-              <a:t>Jan-Philipp Töberg / Projektarbeit SS18</a:t>
-            </a:r>
-            <a:endParaRPr lang="de-DE" dirty="0"/>
-          </a:p>
-        </p:txBody>
-      </p:sp>
-      <p:sp>
-        <p:nvSpPr>
-          <p:cNvPr id="6" name="Foliennummernplatzhalter 5">
-            <a:extLst>
-              <a:ext uri="{FF2B5EF4-FFF2-40B4-BE49-F238E27FC236}">
-                <a16:creationId xmlns:a16="http://schemas.microsoft.com/office/drawing/2014/main" id="{2C10D558-D758-43BA-8345-AC431D702023}"/>
-              </a:ext>
-            </a:extLst>
-          </p:cNvPr>
-          <p:cNvSpPr>
-            <a:spLocks noGrp="1"/>
-          </p:cNvSpPr>
-          <p:nvPr>
-            <p:ph type="sldNum" sz="quarter" idx="12"/>
-          </p:nvPr>
-        </p:nvSpPr>
-        <p:spPr/>
-        <p:txBody>
-          <a:bodyPr/>
-          <a:lstStyle/>
-          <a:p>
-            <a:pPr rtl="0"/>
-            <a:fld id="{C014DD1E-5D91-48A3-AD6D-45FBA980D106}" type="slidenum">
-              <a:rPr lang="de-DE" smtClean="0"/>
-              <a:t>16</a:t>
-            </a:fld>
-            <a:endParaRPr lang="de-DE" dirty="0"/>
-          </a:p>
-        </p:txBody>
-      </p:sp>
-      <p:pic>
-        <p:nvPicPr>
-          <p:cNvPr id="11" name="Grafik 10">
-            <a:extLst>
-              <a:ext uri="{FF2B5EF4-FFF2-40B4-BE49-F238E27FC236}">
-                <a16:creationId xmlns:a16="http://schemas.microsoft.com/office/drawing/2014/main" id="{D36BD0A0-6C3D-4CC1-92AE-DD362763ED5C}"/>
-              </a:ext>
-            </a:extLst>
-          </p:cNvPr>
-          <p:cNvPicPr>
-            <a:picLocks noChangeAspect="1"/>
-          </p:cNvPicPr>
-          <p:nvPr/>
-        </p:nvPicPr>
-        <p:blipFill>
-          <a:blip r:embed="rId3">
-            <a:extLst>
-              <a:ext uri="{28A0092B-C50C-407E-A947-70E740481C1C}">
-                <a14:useLocalDpi xmlns:a14="http://schemas.microsoft.com/office/drawing/2010/main" val="0"/>
-              </a:ext>
-            </a:extLst>
-          </a:blip>
-          <a:stretch>
-            <a:fillRect/>
-          </a:stretch>
-        </p:blipFill>
-        <p:spPr>
-          <a:xfrm>
-            <a:off x="7030516" y="1124744"/>
-            <a:ext cx="680383" cy="792088"/>
-          </a:xfrm>
-          <a:prstGeom prst="rect">
-            <a:avLst/>
-          </a:prstGeom>
-        </p:spPr>
-      </p:pic>
-      <p:pic>
-        <p:nvPicPr>
-          <p:cNvPr id="12" name="Grafik 11">
-            <a:extLst>
-              <a:ext uri="{FF2B5EF4-FFF2-40B4-BE49-F238E27FC236}">
-                <a16:creationId xmlns:a16="http://schemas.microsoft.com/office/drawing/2014/main" id="{02E95E5B-0056-4A87-B34A-912300C26C6C}"/>
-              </a:ext>
-            </a:extLst>
-          </p:cNvPr>
-          <p:cNvPicPr>
-            <a:picLocks noChangeAspect="1"/>
-          </p:cNvPicPr>
-          <p:nvPr/>
-        </p:nvPicPr>
-        <p:blipFill>
-          <a:blip r:embed="rId3">
-            <a:extLst>
-              <a:ext uri="{28A0092B-C50C-407E-A947-70E740481C1C}">
-                <a14:useLocalDpi xmlns:a14="http://schemas.microsoft.com/office/drawing/2010/main" val="0"/>
-              </a:ext>
-            </a:extLst>
-          </a:blip>
-          <a:stretch>
-            <a:fillRect/>
-          </a:stretch>
-        </p:blipFill>
-        <p:spPr>
-          <a:xfrm>
-            <a:off x="6350133" y="2276872"/>
-            <a:ext cx="680383" cy="792088"/>
-          </a:xfrm>
-          <a:prstGeom prst="rect">
-            <a:avLst/>
-          </a:prstGeom>
-        </p:spPr>
-      </p:pic>
-      <p:pic>
-        <p:nvPicPr>
-          <p:cNvPr id="15" name="Grafik 14">
-            <a:extLst>
-              <a:ext uri="{FF2B5EF4-FFF2-40B4-BE49-F238E27FC236}">
-                <a16:creationId xmlns:a16="http://schemas.microsoft.com/office/drawing/2014/main" id="{32BEC22E-9D78-4EEB-9400-FD5388E62171}"/>
-              </a:ext>
-            </a:extLst>
-          </p:cNvPr>
-          <p:cNvPicPr>
-            <a:picLocks noChangeAspect="1"/>
-          </p:cNvPicPr>
-          <p:nvPr/>
-        </p:nvPicPr>
-        <p:blipFill>
-          <a:blip r:embed="rId4" cstate="print">
-            <a:extLst>
-              <a:ext uri="{28A0092B-C50C-407E-A947-70E740481C1C}">
-                <a14:useLocalDpi xmlns:a14="http://schemas.microsoft.com/office/drawing/2010/main" val="0"/>
-              </a:ext>
-            </a:extLst>
-          </a:blip>
-          <a:stretch>
-            <a:fillRect/>
-          </a:stretch>
-        </p:blipFill>
-        <p:spPr>
-          <a:xfrm>
-            <a:off x="5468744" y="4869160"/>
-            <a:ext cx="625668" cy="625668"/>
-          </a:xfrm>
-          <a:prstGeom prst="rect">
-            <a:avLst/>
-          </a:prstGeom>
-        </p:spPr>
-      </p:pic>
-      <p:pic>
-        <p:nvPicPr>
-          <p:cNvPr id="16" name="Grafik 15">
-            <a:extLst>
-              <a:ext uri="{FF2B5EF4-FFF2-40B4-BE49-F238E27FC236}">
-                <a16:creationId xmlns:a16="http://schemas.microsoft.com/office/drawing/2014/main" id="{9367CE9D-9A4F-44A2-8A3A-B658923C3CCB}"/>
-              </a:ext>
-            </a:extLst>
-          </p:cNvPr>
-          <p:cNvPicPr>
-            <a:picLocks noChangeAspect="1"/>
-          </p:cNvPicPr>
-          <p:nvPr/>
-        </p:nvPicPr>
-        <p:blipFill>
-          <a:blip r:embed="rId3">
-            <a:extLst>
-              <a:ext uri="{28A0092B-C50C-407E-A947-70E740481C1C}">
-                <a14:useLocalDpi xmlns:a14="http://schemas.microsoft.com/office/drawing/2010/main" val="0"/>
-              </a:ext>
-            </a:extLst>
-          </a:blip>
-          <a:stretch>
-            <a:fillRect/>
-          </a:stretch>
-        </p:blipFill>
-        <p:spPr>
-          <a:xfrm>
-            <a:off x="8395133" y="3456430"/>
-            <a:ext cx="680383" cy="792088"/>
-          </a:xfrm>
-          <a:prstGeom prst="rect">
-            <a:avLst/>
-          </a:prstGeom>
-        </p:spPr>
-      </p:pic>
-      <p:pic>
-        <p:nvPicPr>
-          <p:cNvPr id="17" name="Grafik 16">
-            <a:extLst>
-              <a:ext uri="{FF2B5EF4-FFF2-40B4-BE49-F238E27FC236}">
-                <a16:creationId xmlns:a16="http://schemas.microsoft.com/office/drawing/2014/main" id="{66EEDB1C-5A39-4C60-853C-AAC529A62BD7}"/>
-              </a:ext>
-            </a:extLst>
-          </p:cNvPr>
-          <p:cNvPicPr>
-            <a:picLocks noChangeAspect="1"/>
-          </p:cNvPicPr>
-          <p:nvPr/>
-        </p:nvPicPr>
-        <p:blipFill>
-          <a:blip r:embed="rId4" cstate="print">
-            <a:extLst>
-              <a:ext uri="{28A0092B-C50C-407E-A947-70E740481C1C}">
-                <a14:useLocalDpi xmlns:a14="http://schemas.microsoft.com/office/drawing/2010/main" val="0"/>
-              </a:ext>
-            </a:extLst>
-          </a:blip>
-          <a:stretch>
-            <a:fillRect/>
-          </a:stretch>
-        </p:blipFill>
-        <p:spPr>
-          <a:xfrm>
-            <a:off x="9075516" y="3650718"/>
-            <a:ext cx="625668" cy="625668"/>
-          </a:xfrm>
-          <a:prstGeom prst="rect">
-            <a:avLst/>
-          </a:prstGeom>
-        </p:spPr>
-      </p:pic>
-    </p:spTree>
-    <p:extLst>
-      <p:ext uri="{BB962C8B-B14F-4D97-AF65-F5344CB8AC3E}">
-        <p14:creationId xmlns:p14="http://schemas.microsoft.com/office/powerpoint/2010/main" val="2311730594"/>
-      </p:ext>
-    </p:extLst>
-  </p:cSld>
-  <p:clrMapOvr>
-    <a:masterClrMapping/>
-  </p:clrMapOvr>
-  <mc:AlternateContent xmlns:mc="http://schemas.openxmlformats.org/markup-compatibility/2006" xmlns:p14="http://schemas.microsoft.com/office/powerpoint/2010/main">
-    <mc:Choice Requires="p14">
-      <p:transition spd="med" p14:dur="700">
-        <p:fade/>
-      </p:transition>
-    </mc:Choice>
-    <mc:Fallback xmlns="">
-      <p:transition spd="med">
-        <p:fade/>
-      </p:transition>
-    </mc:Fallback>
-  </mc:AlternateContent>
   <p:timing>
     <p:tnLst>
       <p:par>
@@ -25259,169 +24810,7 @@
                                           </p:stCondLst>
                                         </p:cTn>
                                         <p:tgtEl>
-                                          <p:spTgt spid="11"/>
-                                        </p:tgtEl>
-                                        <p:attrNameLst>
-                                          <p:attrName>style.visibility</p:attrName>
-                                        </p:attrNameLst>
-                                      </p:cBhvr>
-                                      <p:to>
-                                        <p:strVal val="visible"/>
-                                      </p:to>
-                                    </p:set>
-                                  </p:childTnLst>
-                                </p:cTn>
-                              </p:par>
-                            </p:childTnLst>
-                          </p:cTn>
-                        </p:par>
-                      </p:childTnLst>
-                    </p:cTn>
-                  </p:par>
-                  <p:par>
-                    <p:cTn id="7" fill="hold">
-                      <p:stCondLst>
-                        <p:cond delay="indefinite"/>
-                      </p:stCondLst>
-                      <p:childTnLst>
-                        <p:par>
-                          <p:cTn id="8" fill="hold">
-                            <p:stCondLst>
-                              <p:cond delay="0"/>
-                            </p:stCondLst>
-                            <p:childTnLst>
-                              <p:par>
-                                <p:cTn id="9" presetID="1" presetClass="entr" presetSubtype="0" fill="hold" nodeType="clickEffect">
-                                  <p:stCondLst>
-                                    <p:cond delay="0"/>
-                                  </p:stCondLst>
-                                  <p:childTnLst>
-                                    <p:set>
-                                      <p:cBhvr>
-                                        <p:cTn id="10" dur="1" fill="hold">
-                                          <p:stCondLst>
-                                            <p:cond delay="0"/>
-                                          </p:stCondLst>
-                                        </p:cTn>
-                                        <p:tgtEl>
-                                          <p:spTgt spid="12"/>
-                                        </p:tgtEl>
-                                        <p:attrNameLst>
-                                          <p:attrName>style.visibility</p:attrName>
-                                        </p:attrNameLst>
-                                      </p:cBhvr>
-                                      <p:to>
-                                        <p:strVal val="visible"/>
-                                      </p:to>
-                                    </p:set>
-                                  </p:childTnLst>
-                                </p:cTn>
-                              </p:par>
-                            </p:childTnLst>
-                          </p:cTn>
-                        </p:par>
-                      </p:childTnLst>
-                    </p:cTn>
-                  </p:par>
-                  <p:par>
-                    <p:cTn id="11" fill="hold">
-                      <p:stCondLst>
-                        <p:cond delay="indefinite"/>
-                      </p:stCondLst>
-                      <p:childTnLst>
-                        <p:par>
-                          <p:cTn id="12" fill="hold">
-                            <p:stCondLst>
-                              <p:cond delay="0"/>
-                            </p:stCondLst>
-                            <p:childTnLst>
-                              <p:par>
-                                <p:cTn id="13" presetID="1" presetClass="entr" presetSubtype="0" fill="hold" nodeType="clickEffect">
-                                  <p:stCondLst>
-                                    <p:cond delay="0"/>
-                                  </p:stCondLst>
-                                  <p:childTnLst>
-                                    <p:set>
-                                      <p:cBhvr>
-                                        <p:cTn id="14" dur="1" fill="hold">
-                                          <p:stCondLst>
-                                            <p:cond delay="0"/>
-                                          </p:stCondLst>
-                                        </p:cTn>
-                                        <p:tgtEl>
-                                          <p:spTgt spid="16"/>
-                                        </p:tgtEl>
-                                        <p:attrNameLst>
-                                          <p:attrName>style.visibility</p:attrName>
-                                        </p:attrNameLst>
-                                      </p:cBhvr>
-                                      <p:to>
-                                        <p:strVal val="visible"/>
-                                      </p:to>
-                                    </p:set>
-                                  </p:childTnLst>
-                                </p:cTn>
-                              </p:par>
-                              <p:par>
-                                <p:cTn id="15" presetID="1" presetClass="entr" presetSubtype="0" fill="hold" nodeType="withEffect">
-                                  <p:stCondLst>
-                                    <p:cond delay="0"/>
-                                  </p:stCondLst>
-                                  <p:childTnLst>
-                                    <p:set>
-                                      <p:cBhvr>
-                                        <p:cTn id="16" dur="1" fill="hold">
-                                          <p:stCondLst>
-                                            <p:cond delay="0"/>
-                                          </p:stCondLst>
-                                        </p:cTn>
-                                        <p:tgtEl>
-                                          <p:spTgt spid="17"/>
-                                        </p:tgtEl>
-                                        <p:attrNameLst>
-                                          <p:attrName>style.visibility</p:attrName>
-                                        </p:attrNameLst>
-                                      </p:cBhvr>
-                                      <p:to>
-                                        <p:strVal val="visible"/>
-                                      </p:to>
-                                    </p:set>
-                                  </p:childTnLst>
-                                </p:cTn>
-                              </p:par>
-                            </p:childTnLst>
-                          </p:cTn>
-                        </p:par>
-                      </p:childTnLst>
-                    </p:cTn>
-                  </p:par>
-                  <p:par>
-                    <p:cTn id="17" fill="hold">
-                      <p:stCondLst>
-                        <p:cond delay="indefinite"/>
-                      </p:stCondLst>
-                      <p:childTnLst>
-                        <p:par>
-                          <p:cTn id="18" fill="hold">
-                            <p:stCondLst>
-                              <p:cond delay="0"/>
-                            </p:stCondLst>
-                            <p:childTnLst>
-                              <p:par>
-                                <p:cTn id="19" presetID="1" presetClass="entr" presetSubtype="0" fill="hold" nodeType="clickEffect">
-                                  <p:stCondLst>
-                                    <p:cond delay="0"/>
-                                  </p:stCondLst>
-                                  <p:childTnLst>
-                                    <p:set>
-                                      <p:cBhvr>
-                                        <p:cTn id="20" dur="1" fill="hold">
-                                          <p:stCondLst>
-                                            <p:cond delay="0"/>
-                                          </p:stCondLst>
-                                        </p:cTn>
-                                        <p:tgtEl>
-                                          <p:spTgt spid="15"/>
+                                          <p:spTgt spid="13"/>
                                         </p:tgtEl>
                                         <p:attrNameLst>
                                           <p:attrName>style.visibility</p:attrName>
@@ -25465,7 +24854,7 @@
 </p:sld>
 </file>
 
-<file path=ppt/slides/slide17.xml><?xml version="1.0" encoding="utf-8"?>
+<file path=ppt/slides/slide16.xml><?xml version="1.0" encoding="utf-8"?>
 <p:sld xmlns:a="http://schemas.openxmlformats.org/drawingml/2006/main" xmlns:r="http://schemas.openxmlformats.org/officeDocument/2006/relationships" xmlns:p="http://schemas.openxmlformats.org/presentationml/2006/main">
   <p:cSld>
     <p:spTree>
@@ -25500,13 +24889,13 @@
         </p:spPr>
         <p:txBody>
           <a:bodyPr rtlCol="0">
-            <a:normAutofit fontScale="90000"/>
+            <a:noAutofit/>
           </a:bodyPr>
           <a:lstStyle/>
           <a:p>
             <a:pPr algn="ctr" rtl="0"/>
             <a:r>
-              <a:rPr lang="de-DE" dirty="0"/>
+              <a:rPr lang="de-DE" sz="3200" b="1" dirty="0"/>
               <a:t>Vielen Dank für ihre Aufmerksamkeit!</a:t>
             </a:r>
           </a:p>
@@ -25566,7 +24955,7 @@
             <a:pPr rtl="0"/>
             <a:fld id="{C014DD1E-5D91-48A3-AD6D-45FBA980D106}" type="slidenum">
               <a:rPr lang="de-DE" smtClean="0"/>
-              <a:t>17</a:t>
+              <a:t>16</a:t>
             </a:fld>
             <a:endParaRPr lang="de-DE" dirty="0"/>
           </a:p>
@@ -25717,7 +25106,7 @@
           <p:nvPr>
             <p:extLst>
               <p:ext uri="{D42A27DB-BD31-4B8C-83A1-F6EECF244321}">
-                <p14:modId xmlns:p14="http://schemas.microsoft.com/office/powerpoint/2010/main" val="2630102934"/>
+                <p14:modId xmlns:p14="http://schemas.microsoft.com/office/powerpoint/2010/main" val="1253250769"/>
               </p:ext>
             </p:extLst>
           </p:nvPr>
@@ -25893,7 +25282,7 @@
         <p:spPr>
           <a:xfrm>
             <a:off x="2522562" y="1096792"/>
-            <a:ext cx="7143700" cy="4664416"/>
+            <a:ext cx="7143700" cy="4664415"/>
           </a:xfrm>
         </p:spPr>
       </p:pic>
@@ -26042,7 +25431,7 @@
           <p:nvPr>
             <p:extLst>
               <p:ext uri="{D42A27DB-BD31-4B8C-83A1-F6EECF244321}">
-                <p14:modId xmlns:p14="http://schemas.microsoft.com/office/powerpoint/2010/main" val="2867069111"/>
+                <p14:modId xmlns:p14="http://schemas.microsoft.com/office/powerpoint/2010/main" val="1812979622"/>
               </p:ext>
             </p:extLst>
           </p:nvPr>
@@ -26124,7 +25513,76 @@
             <a:pPr algn="ctr" rtl="0"/>
             <a:r>
               <a:rPr lang="de-DE" dirty="0"/>
-              <a:t>Analysephase – c‘t Programm</a:t>
+              <a:t>Anforderungen</a:t>
+            </a:r>
+          </a:p>
+        </p:txBody>
+      </p:sp>
+      <p:sp>
+        <p:nvSpPr>
+          <p:cNvPr id="3" name="Inhaltsplatzhalter 2">
+            <a:extLst>
+              <a:ext uri="{FF2B5EF4-FFF2-40B4-BE49-F238E27FC236}">
+                <a16:creationId xmlns:a16="http://schemas.microsoft.com/office/drawing/2014/main" id="{2354811B-43F9-4706-B744-6E7350D7DE39}"/>
+              </a:ext>
+            </a:extLst>
+          </p:cNvPr>
+          <p:cNvSpPr>
+            <a:spLocks noGrp="1"/>
+          </p:cNvSpPr>
+          <p:nvPr>
+            <p:ph idx="1"/>
+          </p:nvPr>
+        </p:nvSpPr>
+        <p:spPr>
+          <a:xfrm>
+            <a:off x="1218883" y="908719"/>
+            <a:ext cx="10360501" cy="5255349"/>
+          </a:xfrm>
+        </p:spPr>
+        <p:txBody>
+          <a:bodyPr/>
+          <a:lstStyle/>
+          <a:p>
+            <a:r>
+              <a:rPr lang="de-DE" dirty="0"/>
+              <a:t>Projekt aus der c‘t lauffähig machen</a:t>
+            </a:r>
+          </a:p>
+          <a:p>
+            <a:endParaRPr lang="de-DE" dirty="0"/>
+          </a:p>
+          <a:p>
+            <a:r>
+              <a:rPr lang="de-DE" dirty="0"/>
+              <a:t>eigene Texte hinzufügen können (ähnlich dem Infomonitor von FB5)</a:t>
+            </a:r>
+          </a:p>
+          <a:p>
+            <a:endParaRPr lang="de-DE" dirty="0"/>
+          </a:p>
+          <a:p>
+            <a:r>
+              <a:rPr lang="de-DE" dirty="0"/>
+              <a:t>schnelle Verarbeitung der eingegebenen Texte</a:t>
+            </a:r>
+          </a:p>
+          <a:p>
+            <a:endParaRPr lang="de-DE" dirty="0"/>
+          </a:p>
+          <a:p>
+            <a:r>
+              <a:rPr lang="de-DE" dirty="0"/>
+              <a:t>Umsetzung in C oder Java (optional)</a:t>
+            </a:r>
+          </a:p>
+          <a:p>
+            <a:endParaRPr lang="de-DE" dirty="0"/>
+          </a:p>
+          <a:p>
+            <a:r>
+              <a:rPr lang="de-DE" dirty="0"/>
+              <a:t>modulare Entwicklung &amp; Kommentare</a:t>
             </a:r>
           </a:p>
         </p:txBody>
@@ -26189,251 +25647,6 @@
           </a:p>
         </p:txBody>
       </p:sp>
-      <p:sp>
-        <p:nvSpPr>
-          <p:cNvPr id="8" name="Inhaltsplatzhalter 7">
-            <a:extLst>
-              <a:ext uri="{FF2B5EF4-FFF2-40B4-BE49-F238E27FC236}">
-                <a16:creationId xmlns:a16="http://schemas.microsoft.com/office/drawing/2014/main" id="{6F44A896-D30B-46EA-85C5-6B30E78AAD7F}"/>
-              </a:ext>
-            </a:extLst>
-          </p:cNvPr>
-          <p:cNvSpPr>
-            <a:spLocks noGrp="1"/>
-          </p:cNvSpPr>
-          <p:nvPr>
-            <p:ph sz="half" idx="1"/>
-          </p:nvPr>
-        </p:nvSpPr>
-        <p:spPr/>
-        <p:txBody>
-          <a:bodyPr/>
-          <a:lstStyle/>
-          <a:p>
-            <a:endParaRPr lang="de-DE"/>
-          </a:p>
-        </p:txBody>
-      </p:sp>
-      <p:sp>
-        <p:nvSpPr>
-          <p:cNvPr id="10" name="Inhaltsplatzhalter 9">
-            <a:extLst>
-              <a:ext uri="{FF2B5EF4-FFF2-40B4-BE49-F238E27FC236}">
-                <a16:creationId xmlns:a16="http://schemas.microsoft.com/office/drawing/2014/main" id="{176075E8-5EEA-4518-8BA3-7CB21980E5DF}"/>
-              </a:ext>
-            </a:extLst>
-          </p:cNvPr>
-          <p:cNvSpPr>
-            <a:spLocks noGrp="1"/>
-          </p:cNvSpPr>
-          <p:nvPr>
-            <p:ph sz="half" idx="2"/>
-          </p:nvPr>
-        </p:nvSpPr>
-        <p:spPr/>
-        <p:txBody>
-          <a:bodyPr/>
-          <a:lstStyle/>
-          <a:p>
-            <a:endParaRPr lang="de-DE"/>
-          </a:p>
-        </p:txBody>
-      </p:sp>
-    </p:spTree>
-    <p:extLst>
-      <p:ext uri="{BB962C8B-B14F-4D97-AF65-F5344CB8AC3E}">
-        <p14:creationId xmlns:p14="http://schemas.microsoft.com/office/powerpoint/2010/main" val="2341911148"/>
-      </p:ext>
-    </p:extLst>
-  </p:cSld>
-  <p:clrMapOvr>
-    <a:masterClrMapping/>
-  </p:clrMapOvr>
-  <mc:AlternateContent xmlns:mc="http://schemas.openxmlformats.org/markup-compatibility/2006" xmlns:p14="http://schemas.microsoft.com/office/powerpoint/2010/main">
-    <mc:Choice Requires="p14">
-      <p:transition spd="med" p14:dur="700">
-        <p:fade/>
-      </p:transition>
-    </mc:Choice>
-    <mc:Fallback xmlns="">
-      <p:transition spd="med">
-        <p:fade/>
-      </p:transition>
-    </mc:Fallback>
-  </mc:AlternateContent>
-</p:sld>
-</file>
-
-<file path=ppt/slides/slide6.xml><?xml version="1.0" encoding="utf-8"?>
-<p:sld xmlns:a="http://schemas.openxmlformats.org/drawingml/2006/main" xmlns:r="http://schemas.openxmlformats.org/officeDocument/2006/relationships" xmlns:p="http://schemas.openxmlformats.org/presentationml/2006/main">
-  <p:cSld>
-    <p:spTree>
-      <p:nvGrpSpPr>
-        <p:cNvPr id="1" name=""/>
-        <p:cNvGrpSpPr/>
-        <p:nvPr/>
-      </p:nvGrpSpPr>
-      <p:grpSpPr>
-        <a:xfrm>
-          <a:off x="0" y="0"/>
-          <a:ext cx="0" cy="0"/>
-          <a:chOff x="0" y="0"/>
-          <a:chExt cx="0" cy="0"/>
-        </a:xfrm>
-      </p:grpSpPr>
-      <p:sp>
-        <p:nvSpPr>
-          <p:cNvPr id="2" name="Titel 1"/>
-          <p:cNvSpPr>
-            <a:spLocks noGrp="1"/>
-          </p:cNvSpPr>
-          <p:nvPr>
-            <p:ph type="title"/>
-          </p:nvPr>
-        </p:nvSpPr>
-        <p:spPr>
-          <a:xfrm>
-            <a:off x="1224000" y="270000"/>
-            <a:ext cx="10360501" cy="562075"/>
-          </a:xfrm>
-        </p:spPr>
-        <p:txBody>
-          <a:bodyPr rtlCol="0">
-            <a:normAutofit fontScale="90000"/>
-          </a:bodyPr>
-          <a:lstStyle/>
-          <a:p>
-            <a:pPr algn="ctr" rtl="0"/>
-            <a:r>
-              <a:rPr lang="de-DE" dirty="0"/>
-              <a:t>Analysephase – Anforderungen</a:t>
-            </a:r>
-          </a:p>
-        </p:txBody>
-      </p:sp>
-      <p:sp>
-        <p:nvSpPr>
-          <p:cNvPr id="3" name="Inhaltsplatzhalter 2">
-            <a:extLst>
-              <a:ext uri="{FF2B5EF4-FFF2-40B4-BE49-F238E27FC236}">
-                <a16:creationId xmlns:a16="http://schemas.microsoft.com/office/drawing/2014/main" id="{2354811B-43F9-4706-B744-6E7350D7DE39}"/>
-              </a:ext>
-            </a:extLst>
-          </p:cNvPr>
-          <p:cNvSpPr>
-            <a:spLocks noGrp="1"/>
-          </p:cNvSpPr>
-          <p:nvPr>
-            <p:ph idx="1"/>
-          </p:nvPr>
-        </p:nvSpPr>
-        <p:spPr>
-          <a:xfrm>
-            <a:off x="1218883" y="908719"/>
-            <a:ext cx="10360501" cy="5255349"/>
-          </a:xfrm>
-        </p:spPr>
-        <p:txBody>
-          <a:bodyPr/>
-          <a:lstStyle/>
-          <a:p>
-            <a:endParaRPr lang="de-DE" dirty="0"/>
-          </a:p>
-          <a:p>
-            <a:r>
-              <a:rPr lang="de-DE" dirty="0"/>
-              <a:t>Projekt aus der c‘t lauffähig machen</a:t>
-            </a:r>
-          </a:p>
-          <a:p>
-            <a:endParaRPr lang="de-DE" dirty="0"/>
-          </a:p>
-          <a:p>
-            <a:r>
-              <a:rPr lang="de-DE" dirty="0"/>
-              <a:t>eigene Texte hinzufügen können (ähnlich dem Infomonitor von FB5)</a:t>
-            </a:r>
-          </a:p>
-          <a:p>
-            <a:endParaRPr lang="de-DE" dirty="0"/>
-          </a:p>
-          <a:p>
-            <a:r>
-              <a:rPr lang="de-DE" dirty="0"/>
-              <a:t>Schnelle Verarbeitung der eingegebenen Texte</a:t>
-            </a:r>
-          </a:p>
-          <a:p>
-            <a:endParaRPr lang="de-DE" dirty="0"/>
-          </a:p>
-          <a:p>
-            <a:r>
-              <a:rPr lang="de-DE" dirty="0"/>
-              <a:t>Umsetzung in C oder Java (optional)</a:t>
-            </a:r>
-          </a:p>
-        </p:txBody>
-      </p:sp>
-      <p:sp>
-        <p:nvSpPr>
-          <p:cNvPr id="4" name="Fußzeilenplatzhalter 3">
-            <a:extLst>
-              <a:ext uri="{FF2B5EF4-FFF2-40B4-BE49-F238E27FC236}">
-                <a16:creationId xmlns:a16="http://schemas.microsoft.com/office/drawing/2014/main" id="{1E8F8C7F-00C3-4E0D-BD50-E1FC2480992F}"/>
-              </a:ext>
-            </a:extLst>
-          </p:cNvPr>
-          <p:cNvSpPr>
-            <a:spLocks noGrp="1"/>
-          </p:cNvSpPr>
-          <p:nvPr>
-            <p:ph type="ftr" sz="quarter" idx="11"/>
-          </p:nvPr>
-        </p:nvSpPr>
-        <p:spPr/>
-        <p:txBody>
-          <a:bodyPr/>
-          <a:lstStyle/>
-          <a:p>
-            <a:pPr rtl="0"/>
-            <a:r>
-              <a:rPr lang="de-DE"/>
-              <a:t>Jan-Philipp Töberg / Projektarbeit SS18</a:t>
-            </a:r>
-            <a:endParaRPr lang="de-DE" dirty="0"/>
-          </a:p>
-        </p:txBody>
-      </p:sp>
-      <p:sp>
-        <p:nvSpPr>
-          <p:cNvPr id="6" name="Foliennummernplatzhalter 5">
-            <a:extLst>
-              <a:ext uri="{FF2B5EF4-FFF2-40B4-BE49-F238E27FC236}">
-                <a16:creationId xmlns:a16="http://schemas.microsoft.com/office/drawing/2014/main" id="{2C10D558-D758-43BA-8345-AC431D702023}"/>
-              </a:ext>
-            </a:extLst>
-          </p:cNvPr>
-          <p:cNvSpPr>
-            <a:spLocks noGrp="1"/>
-          </p:cNvSpPr>
-          <p:nvPr>
-            <p:ph type="sldNum" sz="quarter" idx="12"/>
-          </p:nvPr>
-        </p:nvSpPr>
-        <p:spPr/>
-        <p:txBody>
-          <a:bodyPr/>
-          <a:lstStyle/>
-          <a:p>
-            <a:pPr rtl="0"/>
-            <a:fld id="{C014DD1E-5D91-48A3-AD6D-45FBA980D106}" type="slidenum">
-              <a:rPr lang="de-DE" smtClean="0"/>
-              <a:t>6</a:t>
-            </a:fld>
-            <a:endParaRPr lang="de-DE" dirty="0"/>
-          </a:p>
-        </p:txBody>
-      </p:sp>
     </p:spTree>
     <p:extLst>
       <p:ext uri="{BB962C8B-B14F-4D97-AF65-F5344CB8AC3E}">
@@ -26459,7 +25672,7 @@
 </p:sld>
 </file>
 
-<file path=ppt/slides/slide7.xml><?xml version="1.0" encoding="utf-8"?>
+<file path=ppt/slides/slide6.xml><?xml version="1.0" encoding="utf-8"?>
 <p:sld xmlns:a="http://schemas.openxmlformats.org/drawingml/2006/main" xmlns:r="http://schemas.openxmlformats.org/officeDocument/2006/relationships" xmlns:p="http://schemas.openxmlformats.org/presentationml/2006/main">
   <p:cSld>
     <p:spTree>
@@ -26560,7 +25773,7 @@
             <a:pPr rtl="0"/>
             <a:fld id="{C014DD1E-5D91-48A3-AD6D-45FBA980D106}" type="slidenum">
               <a:rPr lang="de-DE" smtClean="0"/>
-              <a:t>7</a:t>
+              <a:t>6</a:t>
             </a:fld>
             <a:endParaRPr lang="de-DE" dirty="0"/>
           </a:p>
@@ -26579,7 +25792,7 @@
           <p:nvPr>
             <p:extLst>
               <p:ext uri="{D42A27DB-BD31-4B8C-83A1-F6EECF244321}">
-                <p14:modId xmlns:p14="http://schemas.microsoft.com/office/powerpoint/2010/main" val="2487514743"/>
+                <p14:modId xmlns:p14="http://schemas.microsoft.com/office/powerpoint/2010/main" val="2597716197"/>
               </p:ext>
             </p:extLst>
           </p:nvPr>
@@ -26619,7 +25832,7 @@
 </p:sld>
 </file>
 
-<file path=ppt/slides/slide8.xml><?xml version="1.0" encoding="utf-8"?>
+<file path=ppt/slides/slide7.xml><?xml version="1.0" encoding="utf-8"?>
 <p:sld xmlns:a="http://schemas.openxmlformats.org/drawingml/2006/main" xmlns:r="http://schemas.openxmlformats.org/officeDocument/2006/relationships" xmlns:p="http://schemas.openxmlformats.org/presentationml/2006/main">
   <p:cSld>
     <p:spTree>
@@ -26718,7 +25931,7 @@
             <a:pPr rtl="0"/>
             <a:fld id="{C014DD1E-5D91-48A3-AD6D-45FBA980D106}" type="slidenum">
               <a:rPr lang="de-DE" smtClean="0"/>
-              <a:t>8</a:t>
+              <a:t>7</a:t>
             </a:fld>
             <a:endParaRPr lang="de-DE" dirty="0"/>
           </a:p>
@@ -27418,7 +26631,7 @@
 </p:sld>
 </file>
 
-<file path=ppt/slides/slide9.xml><?xml version="1.0" encoding="utf-8"?>
+<file path=ppt/slides/slide8.xml><?xml version="1.0" encoding="utf-8"?>
 <p:sld xmlns:a="http://schemas.openxmlformats.org/drawingml/2006/main" xmlns:r="http://schemas.openxmlformats.org/officeDocument/2006/relationships" xmlns:p="http://schemas.openxmlformats.org/presentationml/2006/main">
   <p:cSld>
     <p:spTree>
@@ -27519,7 +26732,7 @@
             <a:pPr rtl="0"/>
             <a:fld id="{C014DD1E-5D91-48A3-AD6D-45FBA980D106}" type="slidenum">
               <a:rPr lang="de-DE" smtClean="0"/>
-              <a:t>9</a:t>
+              <a:t>8</a:t>
             </a:fld>
             <a:endParaRPr lang="de-DE" dirty="0"/>
           </a:p>
@@ -27538,7 +26751,7 @@
           <p:nvPr>
             <p:extLst>
               <p:ext uri="{D42A27DB-BD31-4B8C-83A1-F6EECF244321}">
-                <p14:modId xmlns:p14="http://schemas.microsoft.com/office/powerpoint/2010/main" val="935840589"/>
+                <p14:modId xmlns:p14="http://schemas.microsoft.com/office/powerpoint/2010/main" val="371296050"/>
               </p:ext>
             </p:extLst>
           </p:nvPr>
@@ -27557,6 +26770,171 @@
     <p:extLst>
       <p:ext uri="{BB962C8B-B14F-4D97-AF65-F5344CB8AC3E}">
         <p14:creationId xmlns:p14="http://schemas.microsoft.com/office/powerpoint/2010/main" val="746708545"/>
+      </p:ext>
+    </p:extLst>
+  </p:cSld>
+  <p:clrMapOvr>
+    <a:masterClrMapping/>
+  </p:clrMapOvr>
+  <mc:AlternateContent xmlns:mc="http://schemas.openxmlformats.org/markup-compatibility/2006" xmlns:p14="http://schemas.microsoft.com/office/powerpoint/2010/main">
+    <mc:Choice Requires="p14">
+      <p:transition spd="med" p14:dur="700">
+        <p:fade/>
+      </p:transition>
+    </mc:Choice>
+    <mc:Fallback xmlns="">
+      <p:transition spd="med">
+        <p:fade/>
+      </p:transition>
+    </mc:Fallback>
+  </mc:AlternateContent>
+</p:sld>
+</file>
+
+<file path=ppt/slides/slide9.xml><?xml version="1.0" encoding="utf-8"?>
+<p:sld xmlns:a="http://schemas.openxmlformats.org/drawingml/2006/main" xmlns:r="http://schemas.openxmlformats.org/officeDocument/2006/relationships" xmlns:p="http://schemas.openxmlformats.org/presentationml/2006/main">
+  <p:cSld>
+    <p:spTree>
+      <p:nvGrpSpPr>
+        <p:cNvPr id="1" name=""/>
+        <p:cNvGrpSpPr/>
+        <p:nvPr/>
+      </p:nvGrpSpPr>
+      <p:grpSpPr>
+        <a:xfrm>
+          <a:off x="0" y="0"/>
+          <a:ext cx="0" cy="0"/>
+          <a:chOff x="0" y="0"/>
+          <a:chExt cx="0" cy="0"/>
+        </a:xfrm>
+      </p:grpSpPr>
+      <p:sp>
+        <p:nvSpPr>
+          <p:cNvPr id="4" name="Titel 3"/>
+          <p:cNvSpPr>
+            <a:spLocks noGrp="1"/>
+          </p:cNvSpPr>
+          <p:nvPr>
+            <p:ph type="title"/>
+          </p:nvPr>
+        </p:nvSpPr>
+        <p:spPr>
+          <a:xfrm>
+            <a:off x="1224000" y="270000"/>
+            <a:ext cx="10360501" cy="634083"/>
+          </a:xfrm>
+        </p:spPr>
+        <p:txBody>
+          <a:bodyPr rtlCol="0"/>
+          <a:lstStyle/>
+          <a:p>
+            <a:pPr algn="ctr" rtl="0"/>
+            <a:r>
+              <a:rPr lang="de-DE" dirty="0"/>
+              <a:t>Umsetzung - Kommunikation</a:t>
+            </a:r>
+          </a:p>
+        </p:txBody>
+      </p:sp>
+      <p:pic>
+        <p:nvPicPr>
+          <p:cNvPr id="8" name="Inhaltsplatzhalter 7">
+            <a:extLst>
+              <a:ext uri="{FF2B5EF4-FFF2-40B4-BE49-F238E27FC236}">
+                <a16:creationId xmlns:a16="http://schemas.microsoft.com/office/drawing/2014/main" id="{43E8FCE4-A37C-4C02-9439-EFC1BC76FBE3}"/>
+              </a:ext>
+            </a:extLst>
+          </p:cNvPr>
+          <p:cNvPicPr>
+            <a:picLocks noGrp="1" noChangeAspect="1"/>
+          </p:cNvPicPr>
+          <p:nvPr>
+            <p:ph idx="1"/>
+          </p:nvPr>
+        </p:nvPicPr>
+        <p:blipFill>
+          <a:blip r:embed="rId3">
+            <a:extLst>
+              <a:ext uri="{28A0092B-C50C-407E-A947-70E740481C1C}">
+                <a14:useLocalDpi xmlns:a14="http://schemas.microsoft.com/office/drawing/2010/main" val="0"/>
+              </a:ext>
+            </a:extLst>
+          </a:blip>
+          <a:stretch>
+            <a:fillRect/>
+          </a:stretch>
+        </p:blipFill>
+        <p:spPr>
+          <a:xfrm>
+            <a:off x="2262474" y="1034905"/>
+            <a:ext cx="8283552" cy="5227948"/>
+          </a:xfrm>
+        </p:spPr>
+      </p:pic>
+      <p:sp>
+        <p:nvSpPr>
+          <p:cNvPr id="2" name="Fußzeilenplatzhalter 1">
+            <a:extLst>
+              <a:ext uri="{FF2B5EF4-FFF2-40B4-BE49-F238E27FC236}">
+                <a16:creationId xmlns:a16="http://schemas.microsoft.com/office/drawing/2014/main" id="{366F0BE8-B140-4101-8D7F-49063527154F}"/>
+              </a:ext>
+            </a:extLst>
+          </p:cNvPr>
+          <p:cNvSpPr>
+            <a:spLocks noGrp="1"/>
+          </p:cNvSpPr>
+          <p:nvPr>
+            <p:ph type="ftr" sz="quarter" idx="11"/>
+          </p:nvPr>
+        </p:nvSpPr>
+        <p:spPr/>
+        <p:txBody>
+          <a:bodyPr/>
+          <a:lstStyle/>
+          <a:p>
+            <a:pPr rtl="0"/>
+            <a:r>
+              <a:rPr lang="de-DE"/>
+              <a:t>Jan-Philipp Töberg / Projektarbeit SS18</a:t>
+            </a:r>
+            <a:endParaRPr lang="de-DE" dirty="0"/>
+          </a:p>
+        </p:txBody>
+      </p:sp>
+      <p:sp>
+        <p:nvSpPr>
+          <p:cNvPr id="3" name="Foliennummernplatzhalter 2">
+            <a:extLst>
+              <a:ext uri="{FF2B5EF4-FFF2-40B4-BE49-F238E27FC236}">
+                <a16:creationId xmlns:a16="http://schemas.microsoft.com/office/drawing/2014/main" id="{E1496EE6-9889-4F3B-B37C-7370A6BFE472}"/>
+              </a:ext>
+            </a:extLst>
+          </p:cNvPr>
+          <p:cNvSpPr>
+            <a:spLocks noGrp="1"/>
+          </p:cNvSpPr>
+          <p:nvPr>
+            <p:ph type="sldNum" sz="quarter" idx="12"/>
+          </p:nvPr>
+        </p:nvSpPr>
+        <p:spPr/>
+        <p:txBody>
+          <a:bodyPr/>
+          <a:lstStyle/>
+          <a:p>
+            <a:pPr rtl="0"/>
+            <a:fld id="{C014DD1E-5D91-48A3-AD6D-45FBA980D106}" type="slidenum">
+              <a:rPr lang="de-DE" smtClean="0"/>
+              <a:t>9</a:t>
+            </a:fld>
+            <a:endParaRPr lang="de-DE" dirty="0"/>
+          </a:p>
+        </p:txBody>
+      </p:sp>
+    </p:spTree>
+    <p:extLst>
+      <p:ext uri="{BB962C8B-B14F-4D97-AF65-F5344CB8AC3E}">
+        <p14:creationId xmlns:p14="http://schemas.microsoft.com/office/powerpoint/2010/main" val="4264977537"/>
       </p:ext>
     </p:extLst>
   </p:cSld>
@@ -28529,142 +27907,6 @@
 </file>
 
 <file path=customXml/item1.xml><?xml version="1.0" encoding="utf-8"?>
-<p:properties xmlns:p="http://schemas.microsoft.com/office/2006/metadata/properties" xmlns:xsi="http://www.w3.org/2001/XMLSchema-instance" xmlns:pc="http://schemas.microsoft.com/office/infopath/2007/PartnerControls">
-  <documentManagement>
-    <LocPublishedLinkedAssetsLookup xmlns="4873beb7-5857-4685-be1f-d57550cc96cc" xsi:nil="true"/>
-    <ApprovalStatus xmlns="4873beb7-5857-4685-be1f-d57550cc96cc">InProgress</ApprovalStatus>
-    <MarketSpecific xmlns="4873beb7-5857-4685-be1f-d57550cc96cc">false</MarketSpecific>
-    <LocComments xmlns="4873beb7-5857-4685-be1f-d57550cc96cc" xsi:nil="true"/>
-    <LocLastLocAttemptVersionTypeLookup xmlns="4873beb7-5857-4685-be1f-d57550cc96cc" xsi:nil="true"/>
-    <DirectSourceMarket xmlns="4873beb7-5857-4685-be1f-d57550cc96cc" xsi:nil="true"/>
-    <ThumbnailAssetId xmlns="4873beb7-5857-4685-be1f-d57550cc96cc" xsi:nil="true"/>
-    <PrimaryImageGen xmlns="4873beb7-5857-4685-be1f-d57550cc96cc">false</PrimaryImageGen>
-    <LocNewPublishedVersionLookup xmlns="4873beb7-5857-4685-be1f-d57550cc96cc" xsi:nil="true"/>
-    <LegacyData xmlns="4873beb7-5857-4685-be1f-d57550cc96cc" xsi:nil="true"/>
-    <LocRecommendedHandoff xmlns="4873beb7-5857-4685-be1f-d57550cc96cc" xsi:nil="true"/>
-    <BusinessGroup xmlns="4873beb7-5857-4685-be1f-d57550cc96cc" xsi:nil="true"/>
-    <BlockPublish xmlns="4873beb7-5857-4685-be1f-d57550cc96cc">false</BlockPublish>
-    <TPFriendlyName xmlns="4873beb7-5857-4685-be1f-d57550cc96cc" xsi:nil="true"/>
-    <LocOverallPublishStatusLookup xmlns="4873beb7-5857-4685-be1f-d57550cc96cc" xsi:nil="true"/>
-    <NumericId xmlns="4873beb7-5857-4685-be1f-d57550cc96cc" xsi:nil="true"/>
-    <APEditor xmlns="4873beb7-5857-4685-be1f-d57550cc96cc">
-      <UserInfo>
-        <DisplayName/>
-        <AccountId xsi:nil="true"/>
-        <AccountType/>
-      </UserInfo>
-    </APEditor>
-    <SourceTitle xmlns="4873beb7-5857-4685-be1f-d57550cc96cc" xsi:nil="true"/>
-    <OpenTemplate xmlns="4873beb7-5857-4685-be1f-d57550cc96cc">true</OpenTemplate>
-    <LocOverallLocStatusLookup xmlns="4873beb7-5857-4685-be1f-d57550cc96cc" xsi:nil="true"/>
-    <UALocComments xmlns="4873beb7-5857-4685-be1f-d57550cc96cc" xsi:nil="true"/>
-    <ParentAssetId xmlns="4873beb7-5857-4685-be1f-d57550cc96cc" xsi:nil="true"/>
-    <IntlLangReviewDate xmlns="4873beb7-5857-4685-be1f-d57550cc96cc" xsi:nil="true"/>
-    <FeatureTagsTaxHTField0 xmlns="4873beb7-5857-4685-be1f-d57550cc96cc">
-      <Terms xmlns="http://schemas.microsoft.com/office/infopath/2007/PartnerControls"/>
-    </FeatureTagsTaxHTField0>
-    <PublishStatusLookup xmlns="4873beb7-5857-4685-be1f-d57550cc96cc">
-      <Value>1345093</Value>
-    </PublishStatusLookup>
-    <Providers xmlns="4873beb7-5857-4685-be1f-d57550cc96cc" xsi:nil="true"/>
-    <MachineTranslated xmlns="4873beb7-5857-4685-be1f-d57550cc96cc">false</MachineTranslated>
-    <OriginalSourceMarket xmlns="4873beb7-5857-4685-be1f-d57550cc96cc" xsi:nil="true"/>
-    <APDescription xmlns="4873beb7-5857-4685-be1f-d57550cc96cc">This simple template design works for technology and  businesses, but it's versatile enough to use in other contexts.  It features multiple slide layouts designed for widescreen (16x9 resolution) and includes a sample SmartArt list and chart that are easily editable.</APDescription>
-    <ClipArtFilename xmlns="4873beb7-5857-4685-be1f-d57550cc96cc" xsi:nil="true"/>
-    <ContentItem xmlns="4873beb7-5857-4685-be1f-d57550cc96cc" xsi:nil="true"/>
-    <TPInstallLocation xmlns="4873beb7-5857-4685-be1f-d57550cc96cc" xsi:nil="true"/>
-    <PublishTargets xmlns="4873beb7-5857-4685-be1f-d57550cc96cc">OfficeOnlineVNext</PublishTargets>
-    <TimesCloned xmlns="4873beb7-5857-4685-be1f-d57550cc96cc" xsi:nil="true"/>
-    <AssetStart xmlns="4873beb7-5857-4685-be1f-d57550cc96cc">2011-11-26T00:30:00+00:00</AssetStart>
-    <Provider xmlns="4873beb7-5857-4685-be1f-d57550cc96cc" xsi:nil="true"/>
-    <AcquiredFrom xmlns="4873beb7-5857-4685-be1f-d57550cc96cc">Internal MS</AcquiredFrom>
-    <FriendlyTitle xmlns="4873beb7-5857-4685-be1f-d57550cc96cc" xsi:nil="true"/>
-    <LastHandOff xmlns="4873beb7-5857-4685-be1f-d57550cc96cc" xsi:nil="true"/>
-    <TPClientViewer xmlns="4873beb7-5857-4685-be1f-d57550cc96cc" xsi:nil="true"/>
-    <TemplateStatus xmlns="4873beb7-5857-4685-be1f-d57550cc96cc">Complete</TemplateStatus>
-    <Downloads xmlns="4873beb7-5857-4685-be1f-d57550cc96cc">0</Downloads>
-    <OOCacheId xmlns="4873beb7-5857-4685-be1f-d57550cc96cc" xsi:nil="true"/>
-    <IsDeleted xmlns="4873beb7-5857-4685-be1f-d57550cc96cc">false</IsDeleted>
-    <LocPublishedDependentAssetsLookup xmlns="4873beb7-5857-4685-be1f-d57550cc96cc" xsi:nil="true"/>
-    <TPExecutable xmlns="4873beb7-5857-4685-be1f-d57550cc96cc" xsi:nil="true"/>
-    <EditorialTags xmlns="4873beb7-5857-4685-be1f-d57550cc96cc" xsi:nil="true"/>
-    <SubmitterId xmlns="4873beb7-5857-4685-be1f-d57550cc96cc" xsi:nil="true"/>
-    <ApprovalLog xmlns="4873beb7-5857-4685-be1f-d57550cc96cc" xsi:nil="true"/>
-    <AssetType xmlns="4873beb7-5857-4685-be1f-d57550cc96cc">TP</AssetType>
-    <BugNumber xmlns="4873beb7-5857-4685-be1f-d57550cc96cc" xsi:nil="true"/>
-    <CSXSubmissionDate xmlns="4873beb7-5857-4685-be1f-d57550cc96cc" xsi:nil="true"/>
-    <CSXUpdate xmlns="4873beb7-5857-4685-be1f-d57550cc96cc">false</CSXUpdate>
-    <Milestone xmlns="4873beb7-5857-4685-be1f-d57550cc96cc" xsi:nil="true"/>
-    <RecommendationsModifier xmlns="4873beb7-5857-4685-be1f-d57550cc96cc" xsi:nil="true"/>
-    <OriginAsset xmlns="4873beb7-5857-4685-be1f-d57550cc96cc" xsi:nil="true"/>
-    <TPComponent xmlns="4873beb7-5857-4685-be1f-d57550cc96cc" xsi:nil="true"/>
-    <AssetId xmlns="4873beb7-5857-4685-be1f-d57550cc96cc">TP102787989</AssetId>
-    <IntlLocPriority xmlns="4873beb7-5857-4685-be1f-d57550cc96cc" xsi:nil="true"/>
-    <PolicheckWords xmlns="4873beb7-5857-4685-be1f-d57550cc96cc" xsi:nil="true"/>
-    <TPLaunchHelpLink xmlns="4873beb7-5857-4685-be1f-d57550cc96cc" xsi:nil="true"/>
-    <TPApplication xmlns="4873beb7-5857-4685-be1f-d57550cc96cc" xsi:nil="true"/>
-    <CrawlForDependencies xmlns="4873beb7-5857-4685-be1f-d57550cc96cc">false</CrawlForDependencies>
-    <HandoffToMSDN xmlns="4873beb7-5857-4685-be1f-d57550cc96cc" xsi:nil="true"/>
-    <PlannedPubDate xmlns="4873beb7-5857-4685-be1f-d57550cc96cc" xsi:nil="true"/>
-    <IntlLangReviewer xmlns="4873beb7-5857-4685-be1f-d57550cc96cc" xsi:nil="true"/>
-    <TrustLevel xmlns="4873beb7-5857-4685-be1f-d57550cc96cc">1 Microsoft Managed Content</TrustLevel>
-    <LocLastLocAttemptVersionLookup xmlns="4873beb7-5857-4685-be1f-d57550cc96cc">694266</LocLastLocAttemptVersionLookup>
-    <LocProcessedForHandoffsLookup xmlns="4873beb7-5857-4685-be1f-d57550cc96cc" xsi:nil="true"/>
-    <IsSearchable xmlns="4873beb7-5857-4685-be1f-d57550cc96cc">true</IsSearchable>
-    <TemplateTemplateType xmlns="4873beb7-5857-4685-be1f-d57550cc96cc">PowerPoint Presentation Template</TemplateTemplateType>
-    <CampaignTagsTaxHTField0 xmlns="4873beb7-5857-4685-be1f-d57550cc96cc">
-      <Terms xmlns="http://schemas.microsoft.com/office/infopath/2007/PartnerControls"/>
-    </CampaignTagsTaxHTField0>
-    <TPNamespace xmlns="4873beb7-5857-4685-be1f-d57550cc96cc" xsi:nil="true"/>
-    <LocOverallPreviewStatusLookup xmlns="4873beb7-5857-4685-be1f-d57550cc96cc" xsi:nil="true"/>
-    <TaxCatchAll xmlns="4873beb7-5857-4685-be1f-d57550cc96cc"/>
-    <Markets xmlns="4873beb7-5857-4685-be1f-d57550cc96cc"/>
-    <UAProjectedTotalWords xmlns="4873beb7-5857-4685-be1f-d57550cc96cc" xsi:nil="true"/>
-    <IntlLangReview xmlns="4873beb7-5857-4685-be1f-d57550cc96cc" xsi:nil="true"/>
-    <OutputCachingOn xmlns="4873beb7-5857-4685-be1f-d57550cc96cc">false</OutputCachingOn>
-    <AverageRating xmlns="4873beb7-5857-4685-be1f-d57550cc96cc" xsi:nil="true"/>
-    <APAuthor xmlns="4873beb7-5857-4685-be1f-d57550cc96cc">
-      <UserInfo>
-        <DisplayName>REDMOND\kristaa</DisplayName>
-        <AccountId>136</AccountId>
-        <AccountType/>
-      </UserInfo>
-    </APAuthor>
-    <LocManualTestRequired xmlns="4873beb7-5857-4685-be1f-d57550cc96cc">false</LocManualTestRequired>
-    <TPCommandLine xmlns="4873beb7-5857-4685-be1f-d57550cc96cc" xsi:nil="true"/>
-    <TPAppVersion xmlns="4873beb7-5857-4685-be1f-d57550cc96cc" xsi:nil="true"/>
-    <EditorialStatus xmlns="4873beb7-5857-4685-be1f-d57550cc96cc">Complete</EditorialStatus>
-    <LastModifiedDateTime xmlns="4873beb7-5857-4685-be1f-d57550cc96cc" xsi:nil="true"/>
-    <ScenarioTagsTaxHTField0 xmlns="4873beb7-5857-4685-be1f-d57550cc96cc">
-      <Terms xmlns="http://schemas.microsoft.com/office/infopath/2007/PartnerControls"/>
-    </ScenarioTagsTaxHTField0>
-    <LocProcessedForMarketsLookup xmlns="4873beb7-5857-4685-be1f-d57550cc96cc" xsi:nil="true"/>
-    <TPLaunchHelpLinkType xmlns="4873beb7-5857-4685-be1f-d57550cc96cc">Template</TPLaunchHelpLinkType>
-    <OriginalRelease xmlns="4873beb7-5857-4685-be1f-d57550cc96cc">15</OriginalRelease>
-    <LocalizationTagsTaxHTField0 xmlns="4873beb7-5857-4685-be1f-d57550cc96cc">
-      <Terms xmlns="http://schemas.microsoft.com/office/infopath/2007/PartnerControls"/>
-    </LocalizationTagsTaxHTField0>
-    <UACurrentWords xmlns="4873beb7-5857-4685-be1f-d57550cc96cc" xsi:nil="true"/>
-    <ArtSampleDocs xmlns="4873beb7-5857-4685-be1f-d57550cc96cc" xsi:nil="true"/>
-    <UALocRecommendation xmlns="4873beb7-5857-4685-be1f-d57550cc96cc">Localize</UALocRecommendation>
-    <Manager xmlns="4873beb7-5857-4685-be1f-d57550cc96cc" xsi:nil="true"/>
-    <LocOverallHandbackStatusLookup xmlns="4873beb7-5857-4685-be1f-d57550cc96cc" xsi:nil="true"/>
-    <ShowIn xmlns="4873beb7-5857-4685-be1f-d57550cc96cc">Show everywhere</ShowIn>
-    <UANotes xmlns="4873beb7-5857-4685-be1f-d57550cc96cc" xsi:nil="true"/>
-    <InternalTagsTaxHTField0 xmlns="4873beb7-5857-4685-be1f-d57550cc96cc">
-      <Terms xmlns="http://schemas.microsoft.com/office/infopath/2007/PartnerControls"/>
-    </InternalTagsTaxHTField0>
-    <CSXHash xmlns="4873beb7-5857-4685-be1f-d57550cc96cc" xsi:nil="true"/>
-    <VoteCount xmlns="4873beb7-5857-4685-be1f-d57550cc96cc" xsi:nil="true"/>
-    <AssetExpire xmlns="4873beb7-5857-4685-be1f-d57550cc96cc">2029-05-12T07:00:00+00:00</AssetExpire>
-    <DSATActionTaken xmlns="4873beb7-5857-4685-be1f-d57550cc96cc" xsi:nil="true"/>
-    <CSXSubmissionMarket xmlns="4873beb7-5857-4685-be1f-d57550cc96cc" xsi:nil="true"/>
-    <LocMarketGroupTiers2 xmlns="4873beb7-5857-4685-be1f-d57550cc96cc" xsi:nil="true"/>
-  </documentManagement>
-</p:properties>
-</file>
-
-<file path=customXml/item2.xml><?xml version="1.0" encoding="utf-8"?>
 <ct:contentTypeSchema xmlns:ct="http://schemas.microsoft.com/office/2006/metadata/contentType" xmlns:ma="http://schemas.microsoft.com/office/2006/metadata/properties/metaAttributes" ct:_="" ma:_="" ma:contentTypeName="TemplateFile" ma:contentTypeID="0x0101006EDDDB5EE6D98C44930B742096920B300400F5B6D36B3EF94B4E9A635CDF2A18F5B8" ma:contentTypeVersion="72" ma:contentTypeDescription="Create a new document." ma:contentTypeScope="" ma:versionID="a23e56308344d904b51738559c3d67c9">
   <xsd:schema xmlns:xsd="http://www.w3.org/2001/XMLSchema" xmlns:xs="http://www.w3.org/2001/XMLSchema" xmlns:p="http://schemas.microsoft.com/office/2006/metadata/properties" xmlns:ns2="4873beb7-5857-4685-be1f-d57550cc96cc" targetNamespace="http://schemas.microsoft.com/office/2006/metadata/properties" ma:root="true" ma:fieldsID="cd0908cc4600e77bf5da051303e00c8d" ns2:_="">
     <xsd:import namespace="4873beb7-5857-4685-be1f-d57550cc96cc"/>
@@ -29704,6 +28946,142 @@
 </ct:contentTypeSchema>
 </file>
 
+<file path=customXml/item2.xml><?xml version="1.0" encoding="utf-8"?>
+<p:properties xmlns:p="http://schemas.microsoft.com/office/2006/metadata/properties" xmlns:xsi="http://www.w3.org/2001/XMLSchema-instance" xmlns:pc="http://schemas.microsoft.com/office/infopath/2007/PartnerControls">
+  <documentManagement>
+    <LocPublishedLinkedAssetsLookup xmlns="4873beb7-5857-4685-be1f-d57550cc96cc" xsi:nil="true"/>
+    <ApprovalStatus xmlns="4873beb7-5857-4685-be1f-d57550cc96cc">InProgress</ApprovalStatus>
+    <MarketSpecific xmlns="4873beb7-5857-4685-be1f-d57550cc96cc">false</MarketSpecific>
+    <LocComments xmlns="4873beb7-5857-4685-be1f-d57550cc96cc" xsi:nil="true"/>
+    <LocLastLocAttemptVersionTypeLookup xmlns="4873beb7-5857-4685-be1f-d57550cc96cc" xsi:nil="true"/>
+    <DirectSourceMarket xmlns="4873beb7-5857-4685-be1f-d57550cc96cc" xsi:nil="true"/>
+    <ThumbnailAssetId xmlns="4873beb7-5857-4685-be1f-d57550cc96cc" xsi:nil="true"/>
+    <PrimaryImageGen xmlns="4873beb7-5857-4685-be1f-d57550cc96cc">false</PrimaryImageGen>
+    <LocNewPublishedVersionLookup xmlns="4873beb7-5857-4685-be1f-d57550cc96cc" xsi:nil="true"/>
+    <LegacyData xmlns="4873beb7-5857-4685-be1f-d57550cc96cc" xsi:nil="true"/>
+    <LocRecommendedHandoff xmlns="4873beb7-5857-4685-be1f-d57550cc96cc" xsi:nil="true"/>
+    <BusinessGroup xmlns="4873beb7-5857-4685-be1f-d57550cc96cc" xsi:nil="true"/>
+    <BlockPublish xmlns="4873beb7-5857-4685-be1f-d57550cc96cc">false</BlockPublish>
+    <TPFriendlyName xmlns="4873beb7-5857-4685-be1f-d57550cc96cc" xsi:nil="true"/>
+    <LocOverallPublishStatusLookup xmlns="4873beb7-5857-4685-be1f-d57550cc96cc" xsi:nil="true"/>
+    <NumericId xmlns="4873beb7-5857-4685-be1f-d57550cc96cc" xsi:nil="true"/>
+    <APEditor xmlns="4873beb7-5857-4685-be1f-d57550cc96cc">
+      <UserInfo>
+        <DisplayName/>
+        <AccountId xsi:nil="true"/>
+        <AccountType/>
+      </UserInfo>
+    </APEditor>
+    <SourceTitle xmlns="4873beb7-5857-4685-be1f-d57550cc96cc" xsi:nil="true"/>
+    <OpenTemplate xmlns="4873beb7-5857-4685-be1f-d57550cc96cc">true</OpenTemplate>
+    <LocOverallLocStatusLookup xmlns="4873beb7-5857-4685-be1f-d57550cc96cc" xsi:nil="true"/>
+    <UALocComments xmlns="4873beb7-5857-4685-be1f-d57550cc96cc" xsi:nil="true"/>
+    <ParentAssetId xmlns="4873beb7-5857-4685-be1f-d57550cc96cc" xsi:nil="true"/>
+    <IntlLangReviewDate xmlns="4873beb7-5857-4685-be1f-d57550cc96cc" xsi:nil="true"/>
+    <FeatureTagsTaxHTField0 xmlns="4873beb7-5857-4685-be1f-d57550cc96cc">
+      <Terms xmlns="http://schemas.microsoft.com/office/infopath/2007/PartnerControls"/>
+    </FeatureTagsTaxHTField0>
+    <PublishStatusLookup xmlns="4873beb7-5857-4685-be1f-d57550cc96cc">
+      <Value>1345093</Value>
+    </PublishStatusLookup>
+    <Providers xmlns="4873beb7-5857-4685-be1f-d57550cc96cc" xsi:nil="true"/>
+    <MachineTranslated xmlns="4873beb7-5857-4685-be1f-d57550cc96cc">false</MachineTranslated>
+    <OriginalSourceMarket xmlns="4873beb7-5857-4685-be1f-d57550cc96cc" xsi:nil="true"/>
+    <APDescription xmlns="4873beb7-5857-4685-be1f-d57550cc96cc">This simple template design works for technology and  businesses, but it's versatile enough to use in other contexts.  It features multiple slide layouts designed for widescreen (16x9 resolution) and includes a sample SmartArt list and chart that are easily editable.</APDescription>
+    <ClipArtFilename xmlns="4873beb7-5857-4685-be1f-d57550cc96cc" xsi:nil="true"/>
+    <ContentItem xmlns="4873beb7-5857-4685-be1f-d57550cc96cc" xsi:nil="true"/>
+    <TPInstallLocation xmlns="4873beb7-5857-4685-be1f-d57550cc96cc" xsi:nil="true"/>
+    <PublishTargets xmlns="4873beb7-5857-4685-be1f-d57550cc96cc">OfficeOnlineVNext</PublishTargets>
+    <TimesCloned xmlns="4873beb7-5857-4685-be1f-d57550cc96cc" xsi:nil="true"/>
+    <AssetStart xmlns="4873beb7-5857-4685-be1f-d57550cc96cc">2011-11-26T00:30:00+00:00</AssetStart>
+    <Provider xmlns="4873beb7-5857-4685-be1f-d57550cc96cc" xsi:nil="true"/>
+    <AcquiredFrom xmlns="4873beb7-5857-4685-be1f-d57550cc96cc">Internal MS</AcquiredFrom>
+    <FriendlyTitle xmlns="4873beb7-5857-4685-be1f-d57550cc96cc" xsi:nil="true"/>
+    <LastHandOff xmlns="4873beb7-5857-4685-be1f-d57550cc96cc" xsi:nil="true"/>
+    <TPClientViewer xmlns="4873beb7-5857-4685-be1f-d57550cc96cc" xsi:nil="true"/>
+    <TemplateStatus xmlns="4873beb7-5857-4685-be1f-d57550cc96cc">Complete</TemplateStatus>
+    <Downloads xmlns="4873beb7-5857-4685-be1f-d57550cc96cc">0</Downloads>
+    <OOCacheId xmlns="4873beb7-5857-4685-be1f-d57550cc96cc" xsi:nil="true"/>
+    <IsDeleted xmlns="4873beb7-5857-4685-be1f-d57550cc96cc">false</IsDeleted>
+    <LocPublishedDependentAssetsLookup xmlns="4873beb7-5857-4685-be1f-d57550cc96cc" xsi:nil="true"/>
+    <TPExecutable xmlns="4873beb7-5857-4685-be1f-d57550cc96cc" xsi:nil="true"/>
+    <EditorialTags xmlns="4873beb7-5857-4685-be1f-d57550cc96cc" xsi:nil="true"/>
+    <SubmitterId xmlns="4873beb7-5857-4685-be1f-d57550cc96cc" xsi:nil="true"/>
+    <ApprovalLog xmlns="4873beb7-5857-4685-be1f-d57550cc96cc" xsi:nil="true"/>
+    <AssetType xmlns="4873beb7-5857-4685-be1f-d57550cc96cc">TP</AssetType>
+    <BugNumber xmlns="4873beb7-5857-4685-be1f-d57550cc96cc" xsi:nil="true"/>
+    <CSXSubmissionDate xmlns="4873beb7-5857-4685-be1f-d57550cc96cc" xsi:nil="true"/>
+    <CSXUpdate xmlns="4873beb7-5857-4685-be1f-d57550cc96cc">false</CSXUpdate>
+    <Milestone xmlns="4873beb7-5857-4685-be1f-d57550cc96cc" xsi:nil="true"/>
+    <RecommendationsModifier xmlns="4873beb7-5857-4685-be1f-d57550cc96cc" xsi:nil="true"/>
+    <OriginAsset xmlns="4873beb7-5857-4685-be1f-d57550cc96cc" xsi:nil="true"/>
+    <TPComponent xmlns="4873beb7-5857-4685-be1f-d57550cc96cc" xsi:nil="true"/>
+    <AssetId xmlns="4873beb7-5857-4685-be1f-d57550cc96cc">TP102787989</AssetId>
+    <IntlLocPriority xmlns="4873beb7-5857-4685-be1f-d57550cc96cc" xsi:nil="true"/>
+    <PolicheckWords xmlns="4873beb7-5857-4685-be1f-d57550cc96cc" xsi:nil="true"/>
+    <TPLaunchHelpLink xmlns="4873beb7-5857-4685-be1f-d57550cc96cc" xsi:nil="true"/>
+    <TPApplication xmlns="4873beb7-5857-4685-be1f-d57550cc96cc" xsi:nil="true"/>
+    <CrawlForDependencies xmlns="4873beb7-5857-4685-be1f-d57550cc96cc">false</CrawlForDependencies>
+    <HandoffToMSDN xmlns="4873beb7-5857-4685-be1f-d57550cc96cc" xsi:nil="true"/>
+    <PlannedPubDate xmlns="4873beb7-5857-4685-be1f-d57550cc96cc" xsi:nil="true"/>
+    <IntlLangReviewer xmlns="4873beb7-5857-4685-be1f-d57550cc96cc" xsi:nil="true"/>
+    <TrustLevel xmlns="4873beb7-5857-4685-be1f-d57550cc96cc">1 Microsoft Managed Content</TrustLevel>
+    <LocLastLocAttemptVersionLookup xmlns="4873beb7-5857-4685-be1f-d57550cc96cc">694266</LocLastLocAttemptVersionLookup>
+    <LocProcessedForHandoffsLookup xmlns="4873beb7-5857-4685-be1f-d57550cc96cc" xsi:nil="true"/>
+    <IsSearchable xmlns="4873beb7-5857-4685-be1f-d57550cc96cc">true</IsSearchable>
+    <TemplateTemplateType xmlns="4873beb7-5857-4685-be1f-d57550cc96cc">PowerPoint Presentation Template</TemplateTemplateType>
+    <CampaignTagsTaxHTField0 xmlns="4873beb7-5857-4685-be1f-d57550cc96cc">
+      <Terms xmlns="http://schemas.microsoft.com/office/infopath/2007/PartnerControls"/>
+    </CampaignTagsTaxHTField0>
+    <TPNamespace xmlns="4873beb7-5857-4685-be1f-d57550cc96cc" xsi:nil="true"/>
+    <LocOverallPreviewStatusLookup xmlns="4873beb7-5857-4685-be1f-d57550cc96cc" xsi:nil="true"/>
+    <TaxCatchAll xmlns="4873beb7-5857-4685-be1f-d57550cc96cc"/>
+    <Markets xmlns="4873beb7-5857-4685-be1f-d57550cc96cc"/>
+    <UAProjectedTotalWords xmlns="4873beb7-5857-4685-be1f-d57550cc96cc" xsi:nil="true"/>
+    <IntlLangReview xmlns="4873beb7-5857-4685-be1f-d57550cc96cc" xsi:nil="true"/>
+    <OutputCachingOn xmlns="4873beb7-5857-4685-be1f-d57550cc96cc">false</OutputCachingOn>
+    <AverageRating xmlns="4873beb7-5857-4685-be1f-d57550cc96cc" xsi:nil="true"/>
+    <APAuthor xmlns="4873beb7-5857-4685-be1f-d57550cc96cc">
+      <UserInfo>
+        <DisplayName>REDMOND\kristaa</DisplayName>
+        <AccountId>136</AccountId>
+        <AccountType/>
+      </UserInfo>
+    </APAuthor>
+    <LocManualTestRequired xmlns="4873beb7-5857-4685-be1f-d57550cc96cc">false</LocManualTestRequired>
+    <TPCommandLine xmlns="4873beb7-5857-4685-be1f-d57550cc96cc" xsi:nil="true"/>
+    <TPAppVersion xmlns="4873beb7-5857-4685-be1f-d57550cc96cc" xsi:nil="true"/>
+    <EditorialStatus xmlns="4873beb7-5857-4685-be1f-d57550cc96cc">Complete</EditorialStatus>
+    <LastModifiedDateTime xmlns="4873beb7-5857-4685-be1f-d57550cc96cc" xsi:nil="true"/>
+    <ScenarioTagsTaxHTField0 xmlns="4873beb7-5857-4685-be1f-d57550cc96cc">
+      <Terms xmlns="http://schemas.microsoft.com/office/infopath/2007/PartnerControls"/>
+    </ScenarioTagsTaxHTField0>
+    <LocProcessedForMarketsLookup xmlns="4873beb7-5857-4685-be1f-d57550cc96cc" xsi:nil="true"/>
+    <TPLaunchHelpLinkType xmlns="4873beb7-5857-4685-be1f-d57550cc96cc">Template</TPLaunchHelpLinkType>
+    <OriginalRelease xmlns="4873beb7-5857-4685-be1f-d57550cc96cc">15</OriginalRelease>
+    <LocalizationTagsTaxHTField0 xmlns="4873beb7-5857-4685-be1f-d57550cc96cc">
+      <Terms xmlns="http://schemas.microsoft.com/office/infopath/2007/PartnerControls"/>
+    </LocalizationTagsTaxHTField0>
+    <UACurrentWords xmlns="4873beb7-5857-4685-be1f-d57550cc96cc" xsi:nil="true"/>
+    <ArtSampleDocs xmlns="4873beb7-5857-4685-be1f-d57550cc96cc" xsi:nil="true"/>
+    <UALocRecommendation xmlns="4873beb7-5857-4685-be1f-d57550cc96cc">Localize</UALocRecommendation>
+    <Manager xmlns="4873beb7-5857-4685-be1f-d57550cc96cc" xsi:nil="true"/>
+    <LocOverallHandbackStatusLookup xmlns="4873beb7-5857-4685-be1f-d57550cc96cc" xsi:nil="true"/>
+    <ShowIn xmlns="4873beb7-5857-4685-be1f-d57550cc96cc">Show everywhere</ShowIn>
+    <UANotes xmlns="4873beb7-5857-4685-be1f-d57550cc96cc" xsi:nil="true"/>
+    <InternalTagsTaxHTField0 xmlns="4873beb7-5857-4685-be1f-d57550cc96cc">
+      <Terms xmlns="http://schemas.microsoft.com/office/infopath/2007/PartnerControls"/>
+    </InternalTagsTaxHTField0>
+    <CSXHash xmlns="4873beb7-5857-4685-be1f-d57550cc96cc" xsi:nil="true"/>
+    <VoteCount xmlns="4873beb7-5857-4685-be1f-d57550cc96cc" xsi:nil="true"/>
+    <AssetExpire xmlns="4873beb7-5857-4685-be1f-d57550cc96cc">2029-05-12T07:00:00+00:00</AssetExpire>
+    <DSATActionTaken xmlns="4873beb7-5857-4685-be1f-d57550cc96cc" xsi:nil="true"/>
+    <CSXSubmissionMarket xmlns="4873beb7-5857-4685-be1f-d57550cc96cc" xsi:nil="true"/>
+    <LocMarketGroupTiers2 xmlns="4873beb7-5857-4685-be1f-d57550cc96cc" xsi:nil="true"/>
+  </documentManagement>
+</p:properties>
+</file>
+
 <file path=customXml/item3.xml><?xml version="1.0" encoding="utf-8"?>
 <?mso-contentType ?>
 <FormTemplates xmlns="http://schemas.microsoft.com/sharepoint/v3/contenttype/forms">
@@ -29714,22 +29092,6 @@
 </file>
 
 <file path=customXml/itemProps1.xml><?xml version="1.0" encoding="utf-8"?>
-<ds:datastoreItem xmlns:ds="http://schemas.openxmlformats.org/officeDocument/2006/customXml" ds:itemID="{60C67BEE-D13F-4BD2-98A5-34D8A0977F68}">
-  <ds:schemaRefs>
-    <ds:schemaRef ds:uri="4873beb7-5857-4685-be1f-d57550cc96cc"/>
-    <ds:schemaRef ds:uri="http://schemas.microsoft.com/office/2006/documentManagement/types"/>
-    <ds:schemaRef ds:uri="http://purl.org/dc/terms/"/>
-    <ds:schemaRef ds:uri="http://schemas.microsoft.com/office/infopath/2007/PartnerControls"/>
-    <ds:schemaRef ds:uri="http://purl.org/dc/dcmitype/"/>
-    <ds:schemaRef ds:uri="http://purl.org/dc/elements/1.1/"/>
-    <ds:schemaRef ds:uri="http://schemas.microsoft.com/office/2006/metadata/properties"/>
-    <ds:schemaRef ds:uri="http://schemas.openxmlformats.org/package/2006/metadata/core-properties"/>
-    <ds:schemaRef ds:uri="http://www.w3.org/XML/1998/namespace"/>
-  </ds:schemaRefs>
-</ds:datastoreItem>
-</file>
-
-<file path=customXml/itemProps2.xml><?xml version="1.0" encoding="utf-8"?>
 <ds:datastoreItem xmlns:ds="http://schemas.openxmlformats.org/officeDocument/2006/customXml" ds:itemID="{A09BF4D4-EF60-4196-BFC3-9462D607978C}">
   <ds:schemaRefs>
     <ds:schemaRef ds:uri="http://schemas.microsoft.com/office/2006/metadata/contentType"/>
@@ -29747,6 +29109,22 @@
 </ds:datastoreItem>
 </file>
 
+<file path=customXml/itemProps2.xml><?xml version="1.0" encoding="utf-8"?>
+<ds:datastoreItem xmlns:ds="http://schemas.openxmlformats.org/officeDocument/2006/customXml" ds:itemID="{60C67BEE-D13F-4BD2-98A5-34D8A0977F68}">
+  <ds:schemaRefs>
+    <ds:schemaRef ds:uri="4873beb7-5857-4685-be1f-d57550cc96cc"/>
+    <ds:schemaRef ds:uri="http://schemas.microsoft.com/office/2006/documentManagement/types"/>
+    <ds:schemaRef ds:uri="http://purl.org/dc/terms/"/>
+    <ds:schemaRef ds:uri="http://schemas.microsoft.com/office/infopath/2007/PartnerControls"/>
+    <ds:schemaRef ds:uri="http://purl.org/dc/dcmitype/"/>
+    <ds:schemaRef ds:uri="http://purl.org/dc/elements/1.1/"/>
+    <ds:schemaRef ds:uri="http://schemas.microsoft.com/office/2006/metadata/properties"/>
+    <ds:schemaRef ds:uri="http://schemas.openxmlformats.org/package/2006/metadata/core-properties"/>
+    <ds:schemaRef ds:uri="http://www.w3.org/XML/1998/namespace"/>
+  </ds:schemaRefs>
+</ds:datastoreItem>
+</file>
+
 <file path=customXml/itemProps3.xml><?xml version="1.0" encoding="utf-8"?>
 <ds:datastoreItem xmlns:ds="http://schemas.openxmlformats.org/officeDocument/2006/customXml" ds:itemID="{3836F65B-1B07-41EE-A0E8-BC6EF3855225}">
   <ds:schemaRefs>

</xml_diff>